<commit_message>
Add animation and INTERSECT logo
</commit_message>
<xml_diff>
--- a/presentations/ProjectManagement.pptx
+++ b/presentations/ProjectManagement.pptx
@@ -223,7 +223,7 @@
           <a:p>
             <a:fld id="{D2D8B8C6-4B17-274F-8E67-EB4AC742A4FC}" type="datetimeFigureOut">
               <a:rPr lang="en-US" smtClean="0"/>
-              <a:t>6/29/23</a:t>
+              <a:t>7/7/23</a:t>
             </a:fld>
             <a:endParaRPr lang="en-US"/>
           </a:p>
@@ -2975,7 +2975,7 @@
           <a:p>
             <a:fld id="{BCC8DBC9-650C-584B-AEB7-2C3D32E66174}" type="datetimeFigureOut">
               <a:rPr lang="en-US" smtClean="0"/>
-              <a:t>6/29/23</a:t>
+              <a:t>7/7/23</a:t>
             </a:fld>
             <a:endParaRPr lang="en-US"/>
           </a:p>
@@ -3173,7 +3173,7 @@
           <a:p>
             <a:fld id="{BCC8DBC9-650C-584B-AEB7-2C3D32E66174}" type="datetimeFigureOut">
               <a:rPr lang="en-US" smtClean="0"/>
-              <a:t>6/29/23</a:t>
+              <a:t>7/7/23</a:t>
             </a:fld>
             <a:endParaRPr lang="en-US"/>
           </a:p>
@@ -3381,7 +3381,7 @@
           <a:p>
             <a:fld id="{BCC8DBC9-650C-584B-AEB7-2C3D32E66174}" type="datetimeFigureOut">
               <a:rPr lang="en-US" smtClean="0"/>
-              <a:t>6/29/23</a:t>
+              <a:t>7/7/23</a:t>
             </a:fld>
             <a:endParaRPr lang="en-US"/>
           </a:p>
@@ -3579,7 +3579,7 @@
           <a:p>
             <a:fld id="{BCC8DBC9-650C-584B-AEB7-2C3D32E66174}" type="datetimeFigureOut">
               <a:rPr lang="en-US" smtClean="0"/>
-              <a:t>6/29/23</a:t>
+              <a:t>7/7/23</a:t>
             </a:fld>
             <a:endParaRPr lang="en-US"/>
           </a:p>
@@ -3854,7 +3854,7 @@
           <a:p>
             <a:fld id="{BCC8DBC9-650C-584B-AEB7-2C3D32E66174}" type="datetimeFigureOut">
               <a:rPr lang="en-US" smtClean="0"/>
-              <a:t>6/29/23</a:t>
+              <a:t>7/7/23</a:t>
             </a:fld>
             <a:endParaRPr lang="en-US"/>
           </a:p>
@@ -4119,7 +4119,7 @@
           <a:p>
             <a:fld id="{BCC8DBC9-650C-584B-AEB7-2C3D32E66174}" type="datetimeFigureOut">
               <a:rPr lang="en-US" smtClean="0"/>
-              <a:t>6/29/23</a:t>
+              <a:t>7/7/23</a:t>
             </a:fld>
             <a:endParaRPr lang="en-US"/>
           </a:p>
@@ -4531,7 +4531,7 @@
           <a:p>
             <a:fld id="{BCC8DBC9-650C-584B-AEB7-2C3D32E66174}" type="datetimeFigureOut">
               <a:rPr lang="en-US" smtClean="0"/>
-              <a:t>6/29/23</a:t>
+              <a:t>7/7/23</a:t>
             </a:fld>
             <a:endParaRPr lang="en-US"/>
           </a:p>
@@ -4672,7 +4672,7 @@
           <a:p>
             <a:fld id="{BCC8DBC9-650C-584B-AEB7-2C3D32E66174}" type="datetimeFigureOut">
               <a:rPr lang="en-US" smtClean="0"/>
-              <a:t>6/29/23</a:t>
+              <a:t>7/7/23</a:t>
             </a:fld>
             <a:endParaRPr lang="en-US"/>
           </a:p>
@@ -4785,7 +4785,7 @@
           <a:p>
             <a:fld id="{BCC8DBC9-650C-584B-AEB7-2C3D32E66174}" type="datetimeFigureOut">
               <a:rPr lang="en-US" smtClean="0"/>
-              <a:t>6/29/23</a:t>
+              <a:t>7/7/23</a:t>
             </a:fld>
             <a:endParaRPr lang="en-US"/>
           </a:p>
@@ -5096,7 +5096,7 @@
           <a:p>
             <a:fld id="{BCC8DBC9-650C-584B-AEB7-2C3D32E66174}" type="datetimeFigureOut">
               <a:rPr lang="en-US" smtClean="0"/>
-              <a:t>6/29/23</a:t>
+              <a:t>7/7/23</a:t>
             </a:fld>
             <a:endParaRPr lang="en-US"/>
           </a:p>
@@ -5384,7 +5384,7 @@
           <a:p>
             <a:fld id="{BCC8DBC9-650C-584B-AEB7-2C3D32E66174}" type="datetimeFigureOut">
               <a:rPr lang="en-US" smtClean="0"/>
-              <a:t>6/29/23</a:t>
+              <a:t>7/7/23</a:t>
             </a:fld>
             <a:endParaRPr lang="en-US"/>
           </a:p>
@@ -5625,7 +5625,7 @@
           <a:p>
             <a:fld id="{BCC8DBC9-650C-584B-AEB7-2C3D32E66174}" type="datetimeFigureOut">
               <a:rPr lang="en-US" smtClean="0"/>
-              <a:t>6/29/23</a:t>
+              <a:t>7/7/23</a:t>
             </a:fld>
             <a:endParaRPr lang="en-US"/>
           </a:p>
@@ -6104,11 +6104,41 @@
           <a:p>
             <a:r>
               <a:rPr lang="en-US" dirty="0"/>
-              <a:t>David Rumph</a:t>
+              <a:t>Dave Rumph</a:t>
             </a:r>
           </a:p>
         </p:txBody>
       </p:sp>
+      <p:pic>
+        <p:nvPicPr>
+          <p:cNvPr id="5" name="Picture 4" descr="A white letter on a purple background&#10;&#10;Description automatically generated">
+            <a:extLst>
+              <a:ext uri="{FF2B5EF4-FFF2-40B4-BE49-F238E27FC236}">
+                <a16:creationId xmlns:a16="http://schemas.microsoft.com/office/drawing/2014/main" id="{420E1F52-2AFF-E9B0-5962-43B704468CE0}"/>
+              </a:ext>
+            </a:extLst>
+          </p:cNvPr>
+          <p:cNvPicPr>
+            <a:picLocks noChangeAspect="1"/>
+          </p:cNvPicPr>
+          <p:nvPr/>
+        </p:nvPicPr>
+        <p:blipFill>
+          <a:blip r:embed="rId3"/>
+          <a:stretch>
+            <a:fillRect/>
+          </a:stretch>
+        </p:blipFill>
+        <p:spPr>
+          <a:xfrm>
+            <a:off x="273957" y="5257800"/>
+            <a:ext cx="1249362" cy="1249362"/>
+          </a:xfrm>
+          <a:prstGeom prst="rect">
+            <a:avLst/>
+          </a:prstGeom>
+        </p:spPr>
+      </p:pic>
     </p:spTree>
     <p:extLst>
       <p:ext uri="{BB962C8B-B14F-4D97-AF65-F5344CB8AC3E}">
@@ -6891,6 +6921,333 @@
   <p:clrMapOvr>
     <a:masterClrMapping/>
   </p:clrMapOvr>
+  <p:timing>
+    <p:tnLst>
+      <p:par>
+        <p:cTn id="1" dur="indefinite" restart="never" nodeType="tmRoot">
+          <p:childTnLst>
+            <p:seq concurrent="1" nextAc="seek">
+              <p:cTn id="2" dur="indefinite" nodeType="mainSeq">
+                <p:childTnLst>
+                  <p:par>
+                    <p:cTn id="3" fill="hold">
+                      <p:stCondLst>
+                        <p:cond delay="indefinite"/>
+                      </p:stCondLst>
+                      <p:childTnLst>
+                        <p:par>
+                          <p:cTn id="4" fill="hold">
+                            <p:stCondLst>
+                              <p:cond delay="0"/>
+                            </p:stCondLst>
+                            <p:childTnLst>
+                              <p:par>
+                                <p:cTn id="5" presetID="1" presetClass="entr" presetSubtype="0" fill="hold" grpId="0" nodeType="clickEffect">
+                                  <p:stCondLst>
+                                    <p:cond delay="0"/>
+                                  </p:stCondLst>
+                                  <p:childTnLst>
+                                    <p:set>
+                                      <p:cBhvr>
+                                        <p:cTn id="6" dur="1" fill="hold">
+                                          <p:stCondLst>
+                                            <p:cond delay="0"/>
+                                          </p:stCondLst>
+                                        </p:cTn>
+                                        <p:tgtEl>
+                                          <p:spTgt spid="3">
+                                            <p:txEl>
+                                              <p:pRg st="0" end="0"/>
+                                            </p:txEl>
+                                          </p:spTgt>
+                                        </p:tgtEl>
+                                        <p:attrNameLst>
+                                          <p:attrName>style.visibility</p:attrName>
+                                        </p:attrNameLst>
+                                      </p:cBhvr>
+                                      <p:to>
+                                        <p:strVal val="visible"/>
+                                      </p:to>
+                                    </p:set>
+                                  </p:childTnLst>
+                                </p:cTn>
+                              </p:par>
+                            </p:childTnLst>
+                          </p:cTn>
+                        </p:par>
+                      </p:childTnLst>
+                    </p:cTn>
+                  </p:par>
+                  <p:par>
+                    <p:cTn id="7" fill="hold">
+                      <p:stCondLst>
+                        <p:cond delay="indefinite"/>
+                      </p:stCondLst>
+                      <p:childTnLst>
+                        <p:par>
+                          <p:cTn id="8" fill="hold">
+                            <p:stCondLst>
+                              <p:cond delay="0"/>
+                            </p:stCondLst>
+                            <p:childTnLst>
+                              <p:par>
+                                <p:cTn id="9" presetID="1" presetClass="entr" presetSubtype="0" fill="hold" grpId="0" nodeType="clickEffect">
+                                  <p:stCondLst>
+                                    <p:cond delay="0"/>
+                                  </p:stCondLst>
+                                  <p:childTnLst>
+                                    <p:set>
+                                      <p:cBhvr>
+                                        <p:cTn id="10" dur="1" fill="hold">
+                                          <p:stCondLst>
+                                            <p:cond delay="0"/>
+                                          </p:stCondLst>
+                                        </p:cTn>
+                                        <p:tgtEl>
+                                          <p:spTgt spid="3">
+                                            <p:txEl>
+                                              <p:pRg st="2" end="2"/>
+                                            </p:txEl>
+                                          </p:spTgt>
+                                        </p:tgtEl>
+                                        <p:attrNameLst>
+                                          <p:attrName>style.visibility</p:attrName>
+                                        </p:attrNameLst>
+                                      </p:cBhvr>
+                                      <p:to>
+                                        <p:strVal val="visible"/>
+                                      </p:to>
+                                    </p:set>
+                                  </p:childTnLst>
+                                </p:cTn>
+                              </p:par>
+                            </p:childTnLst>
+                          </p:cTn>
+                        </p:par>
+                      </p:childTnLst>
+                    </p:cTn>
+                  </p:par>
+                  <p:par>
+                    <p:cTn id="11" fill="hold">
+                      <p:stCondLst>
+                        <p:cond delay="indefinite"/>
+                      </p:stCondLst>
+                      <p:childTnLst>
+                        <p:par>
+                          <p:cTn id="12" fill="hold">
+                            <p:stCondLst>
+                              <p:cond delay="0"/>
+                            </p:stCondLst>
+                            <p:childTnLst>
+                              <p:par>
+                                <p:cTn id="13" presetID="1" presetClass="entr" presetSubtype="0" fill="hold" grpId="0" nodeType="clickEffect">
+                                  <p:stCondLst>
+                                    <p:cond delay="0"/>
+                                  </p:stCondLst>
+                                  <p:childTnLst>
+                                    <p:set>
+                                      <p:cBhvr>
+                                        <p:cTn id="14" dur="1" fill="hold">
+                                          <p:stCondLst>
+                                            <p:cond delay="0"/>
+                                          </p:stCondLst>
+                                        </p:cTn>
+                                        <p:tgtEl>
+                                          <p:spTgt spid="3">
+                                            <p:txEl>
+                                              <p:pRg st="3" end="3"/>
+                                            </p:txEl>
+                                          </p:spTgt>
+                                        </p:tgtEl>
+                                        <p:attrNameLst>
+                                          <p:attrName>style.visibility</p:attrName>
+                                        </p:attrNameLst>
+                                      </p:cBhvr>
+                                      <p:to>
+                                        <p:strVal val="visible"/>
+                                      </p:to>
+                                    </p:set>
+                                  </p:childTnLst>
+                                </p:cTn>
+                              </p:par>
+                            </p:childTnLst>
+                          </p:cTn>
+                        </p:par>
+                      </p:childTnLst>
+                    </p:cTn>
+                  </p:par>
+                  <p:par>
+                    <p:cTn id="15" fill="hold">
+                      <p:stCondLst>
+                        <p:cond delay="indefinite"/>
+                      </p:stCondLst>
+                      <p:childTnLst>
+                        <p:par>
+                          <p:cTn id="16" fill="hold">
+                            <p:stCondLst>
+                              <p:cond delay="0"/>
+                            </p:stCondLst>
+                            <p:childTnLst>
+                              <p:par>
+                                <p:cTn id="17" presetID="1" presetClass="entr" presetSubtype="0" fill="hold" grpId="0" nodeType="clickEffect">
+                                  <p:stCondLst>
+                                    <p:cond delay="0"/>
+                                  </p:stCondLst>
+                                  <p:childTnLst>
+                                    <p:set>
+                                      <p:cBhvr>
+                                        <p:cTn id="18" dur="1" fill="hold">
+                                          <p:stCondLst>
+                                            <p:cond delay="0"/>
+                                          </p:stCondLst>
+                                        </p:cTn>
+                                        <p:tgtEl>
+                                          <p:spTgt spid="3">
+                                            <p:txEl>
+                                              <p:pRg st="4" end="4"/>
+                                            </p:txEl>
+                                          </p:spTgt>
+                                        </p:tgtEl>
+                                        <p:attrNameLst>
+                                          <p:attrName>style.visibility</p:attrName>
+                                        </p:attrNameLst>
+                                      </p:cBhvr>
+                                      <p:to>
+                                        <p:strVal val="visible"/>
+                                      </p:to>
+                                    </p:set>
+                                  </p:childTnLst>
+                                </p:cTn>
+                              </p:par>
+                            </p:childTnLst>
+                          </p:cTn>
+                        </p:par>
+                      </p:childTnLst>
+                    </p:cTn>
+                  </p:par>
+                  <p:par>
+                    <p:cTn id="19" fill="hold">
+                      <p:stCondLst>
+                        <p:cond delay="indefinite"/>
+                      </p:stCondLst>
+                      <p:childTnLst>
+                        <p:par>
+                          <p:cTn id="20" fill="hold">
+                            <p:stCondLst>
+                              <p:cond delay="0"/>
+                            </p:stCondLst>
+                            <p:childTnLst>
+                              <p:par>
+                                <p:cTn id="21" presetID="1" presetClass="entr" presetSubtype="0" fill="hold" grpId="0" nodeType="clickEffect">
+                                  <p:stCondLst>
+                                    <p:cond delay="0"/>
+                                  </p:stCondLst>
+                                  <p:childTnLst>
+                                    <p:set>
+                                      <p:cBhvr>
+                                        <p:cTn id="22" dur="1" fill="hold">
+                                          <p:stCondLst>
+                                            <p:cond delay="0"/>
+                                          </p:stCondLst>
+                                        </p:cTn>
+                                        <p:tgtEl>
+                                          <p:spTgt spid="3">
+                                            <p:txEl>
+                                              <p:pRg st="5" end="5"/>
+                                            </p:txEl>
+                                          </p:spTgt>
+                                        </p:tgtEl>
+                                        <p:attrNameLst>
+                                          <p:attrName>style.visibility</p:attrName>
+                                        </p:attrNameLst>
+                                      </p:cBhvr>
+                                      <p:to>
+                                        <p:strVal val="visible"/>
+                                      </p:to>
+                                    </p:set>
+                                  </p:childTnLst>
+                                </p:cTn>
+                              </p:par>
+                            </p:childTnLst>
+                          </p:cTn>
+                        </p:par>
+                      </p:childTnLst>
+                    </p:cTn>
+                  </p:par>
+                  <p:par>
+                    <p:cTn id="23" fill="hold">
+                      <p:stCondLst>
+                        <p:cond delay="indefinite"/>
+                      </p:stCondLst>
+                      <p:childTnLst>
+                        <p:par>
+                          <p:cTn id="24" fill="hold">
+                            <p:stCondLst>
+                              <p:cond delay="0"/>
+                            </p:stCondLst>
+                            <p:childTnLst>
+                              <p:par>
+                                <p:cTn id="25" presetID="1" presetClass="entr" presetSubtype="0" fill="hold" grpId="0" nodeType="clickEffect">
+                                  <p:stCondLst>
+                                    <p:cond delay="0"/>
+                                  </p:stCondLst>
+                                  <p:childTnLst>
+                                    <p:set>
+                                      <p:cBhvr>
+                                        <p:cTn id="26" dur="1" fill="hold">
+                                          <p:stCondLst>
+                                            <p:cond delay="0"/>
+                                          </p:stCondLst>
+                                        </p:cTn>
+                                        <p:tgtEl>
+                                          <p:spTgt spid="3">
+                                            <p:txEl>
+                                              <p:pRg st="7" end="7"/>
+                                            </p:txEl>
+                                          </p:spTgt>
+                                        </p:tgtEl>
+                                        <p:attrNameLst>
+                                          <p:attrName>style.visibility</p:attrName>
+                                        </p:attrNameLst>
+                                      </p:cBhvr>
+                                      <p:to>
+                                        <p:strVal val="visible"/>
+                                      </p:to>
+                                    </p:set>
+                                  </p:childTnLst>
+                                </p:cTn>
+                              </p:par>
+                            </p:childTnLst>
+                          </p:cTn>
+                        </p:par>
+                      </p:childTnLst>
+                    </p:cTn>
+                  </p:par>
+                </p:childTnLst>
+              </p:cTn>
+              <p:prevCondLst>
+                <p:cond evt="onPrev" delay="0">
+                  <p:tgtEl>
+                    <p:sldTgt/>
+                  </p:tgtEl>
+                </p:cond>
+              </p:prevCondLst>
+              <p:nextCondLst>
+                <p:cond evt="onNext" delay="0">
+                  <p:tgtEl>
+                    <p:sldTgt/>
+                  </p:tgtEl>
+                </p:cond>
+              </p:nextCondLst>
+            </p:seq>
+          </p:childTnLst>
+        </p:cTn>
+      </p:par>
+    </p:tnLst>
+    <p:bldLst>
+      <p:bldP spid="3" grpId="0" build="p"/>
+    </p:bldLst>
+  </p:timing>
 </p:sld>
 </file>
 
@@ -7001,6 +7358,140 @@
   <p:clrMapOvr>
     <a:masterClrMapping/>
   </p:clrMapOvr>
+  <p:timing>
+    <p:tnLst>
+      <p:par>
+        <p:cTn id="1" dur="indefinite" restart="never" nodeType="tmRoot">
+          <p:childTnLst>
+            <p:seq concurrent="1" nextAc="seek">
+              <p:cTn id="2" restart="whenNotActive" fill="hold" evtFilter="cancelBubble" nodeType="interactiveSeq">
+                <p:stCondLst>
+                  <p:cond evt="onClick" delay="0">
+                    <p:tgtEl>
+                      <p:spTgt spid="3"/>
+                    </p:tgtEl>
+                  </p:cond>
+                </p:stCondLst>
+                <p:endSync evt="end" delay="0">
+                  <p:rtn val="all"/>
+                </p:endSync>
+                <p:childTnLst>
+                  <p:par>
+                    <p:cTn id="3" fill="hold">
+                      <p:stCondLst>
+                        <p:cond delay="0"/>
+                      </p:stCondLst>
+                      <p:childTnLst>
+                        <p:par>
+                          <p:cTn id="4" fill="hold">
+                            <p:stCondLst>
+                              <p:cond delay="0"/>
+                            </p:stCondLst>
+                            <p:childTnLst>
+                              <p:par>
+                                <p:cTn id="5" presetID="1" presetClass="entr" presetSubtype="0" fill="hold" grpId="0" nodeType="clickEffect">
+                                  <p:stCondLst>
+                                    <p:cond delay="0"/>
+                                  </p:stCondLst>
+                                  <p:childTnLst>
+                                    <p:set>
+                                      <p:cBhvr>
+                                        <p:cTn id="6" dur="1" fill="hold">
+                                          <p:stCondLst>
+                                            <p:cond delay="0"/>
+                                          </p:stCondLst>
+                                        </p:cTn>
+                                        <p:tgtEl>
+                                          <p:spTgt spid="3">
+                                            <p:txEl>
+                                              <p:pRg st="0" end="0"/>
+                                            </p:txEl>
+                                          </p:spTgt>
+                                        </p:tgtEl>
+                                        <p:attrNameLst>
+                                          <p:attrName>style.visibility</p:attrName>
+                                        </p:attrNameLst>
+                                      </p:cBhvr>
+                                      <p:to>
+                                        <p:strVal val="visible"/>
+                                      </p:to>
+                                    </p:set>
+                                  </p:childTnLst>
+                                </p:cTn>
+                              </p:par>
+                            </p:childTnLst>
+                          </p:cTn>
+                        </p:par>
+                      </p:childTnLst>
+                    </p:cTn>
+                  </p:par>
+                  <p:par>
+                    <p:cTn id="7" fill="hold">
+                      <p:stCondLst>
+                        <p:cond delay="indefinite"/>
+                      </p:stCondLst>
+                      <p:childTnLst>
+                        <p:par>
+                          <p:cTn id="8" fill="hold">
+                            <p:stCondLst>
+                              <p:cond delay="0"/>
+                            </p:stCondLst>
+                            <p:childTnLst>
+                              <p:par>
+                                <p:cTn id="9" presetID="1" presetClass="entr" presetSubtype="0" fill="hold" grpId="0" nodeType="clickEffect">
+                                  <p:stCondLst>
+                                    <p:cond delay="0"/>
+                                  </p:stCondLst>
+                                  <p:childTnLst>
+                                    <p:set>
+                                      <p:cBhvr>
+                                        <p:cTn id="10" dur="1" fill="hold">
+                                          <p:stCondLst>
+                                            <p:cond delay="0"/>
+                                          </p:stCondLst>
+                                        </p:cTn>
+                                        <p:tgtEl>
+                                          <p:spTgt spid="3">
+                                            <p:txEl>
+                                              <p:pRg st="3" end="3"/>
+                                            </p:txEl>
+                                          </p:spTgt>
+                                        </p:tgtEl>
+                                        <p:attrNameLst>
+                                          <p:attrName>style.visibility</p:attrName>
+                                        </p:attrNameLst>
+                                      </p:cBhvr>
+                                      <p:to>
+                                        <p:strVal val="visible"/>
+                                      </p:to>
+                                    </p:set>
+                                  </p:childTnLst>
+                                </p:cTn>
+                              </p:par>
+                            </p:childTnLst>
+                          </p:cTn>
+                        </p:par>
+                      </p:childTnLst>
+                    </p:cTn>
+                  </p:par>
+                </p:childTnLst>
+              </p:cTn>
+              <p:nextCondLst>
+                <p:cond evt="onClick" delay="0">
+                  <p:tgtEl>
+                    <p:spTgt spid="3"/>
+                  </p:tgtEl>
+                </p:cond>
+              </p:nextCondLst>
+            </p:seq>
+          </p:childTnLst>
+        </p:cTn>
+      </p:par>
+    </p:tnLst>
+    <p:bldLst>
+      <p:bldP spid="3" grpId="0" uiExpand="1" build="p"/>
+    </p:bldLst>
+  </p:timing>
 </p:sld>
 </file>
 
@@ -7530,7 +8021,7 @@
             </a:br>
             <a:r>
               <a:rPr lang="en-US" dirty="0"/>
-              <a:t>Processes and Tools (2)</a:t>
+              <a:t>Processes and Tools</a:t>
             </a:r>
           </a:p>
         </p:txBody>
@@ -10948,6 +11439,150 @@
   <p:clrMapOvr>
     <a:masterClrMapping/>
   </p:clrMapOvr>
+  <p:timing>
+    <p:tnLst>
+      <p:par>
+        <p:cTn id="1" dur="indefinite" restart="never" nodeType="tmRoot">
+          <p:childTnLst>
+            <p:seq concurrent="1" nextAc="seek">
+              <p:cTn id="2" dur="indefinite" nodeType="mainSeq">
+                <p:childTnLst>
+                  <p:par>
+                    <p:cTn id="3" fill="hold">
+                      <p:stCondLst>
+                        <p:cond delay="indefinite"/>
+                      </p:stCondLst>
+                      <p:childTnLst>
+                        <p:par>
+                          <p:cTn id="4" fill="hold">
+                            <p:stCondLst>
+                              <p:cond delay="0"/>
+                            </p:stCondLst>
+                            <p:childTnLst>
+                              <p:par>
+                                <p:cTn id="5" presetID="1" presetClass="entr" presetSubtype="0" fill="hold" grpId="0" nodeType="clickEffect">
+                                  <p:stCondLst>
+                                    <p:cond delay="0"/>
+                                  </p:stCondLst>
+                                  <p:childTnLst>
+                                    <p:set>
+                                      <p:cBhvr>
+                                        <p:cTn id="6" dur="1" fill="hold">
+                                          <p:stCondLst>
+                                            <p:cond delay="0"/>
+                                          </p:stCondLst>
+                                        </p:cTn>
+                                        <p:tgtEl>
+                                          <p:spTgt spid="3">
+                                            <p:txEl>
+                                              <p:pRg st="0" end="0"/>
+                                            </p:txEl>
+                                          </p:spTgt>
+                                        </p:tgtEl>
+                                        <p:attrNameLst>
+                                          <p:attrName>style.visibility</p:attrName>
+                                        </p:attrNameLst>
+                                      </p:cBhvr>
+                                      <p:to>
+                                        <p:strVal val="visible"/>
+                                      </p:to>
+                                    </p:set>
+                                  </p:childTnLst>
+                                </p:cTn>
+                              </p:par>
+                              <p:par>
+                                <p:cTn id="7" presetID="1" presetClass="entr" presetSubtype="0" fill="hold" grpId="0" nodeType="withEffect">
+                                  <p:stCondLst>
+                                    <p:cond delay="0"/>
+                                  </p:stCondLst>
+                                  <p:childTnLst>
+                                    <p:set>
+                                      <p:cBhvr>
+                                        <p:cTn id="8" dur="1" fill="hold">
+                                          <p:stCondLst>
+                                            <p:cond delay="0"/>
+                                          </p:stCondLst>
+                                        </p:cTn>
+                                        <p:tgtEl>
+                                          <p:spTgt spid="3">
+                                            <p:txEl>
+                                              <p:pRg st="1" end="1"/>
+                                            </p:txEl>
+                                          </p:spTgt>
+                                        </p:tgtEl>
+                                        <p:attrNameLst>
+                                          <p:attrName>style.visibility</p:attrName>
+                                        </p:attrNameLst>
+                                      </p:cBhvr>
+                                      <p:to>
+                                        <p:strVal val="visible"/>
+                                      </p:to>
+                                    </p:set>
+                                  </p:childTnLst>
+                                </p:cTn>
+                              </p:par>
+                              <p:par>
+                                <p:cTn id="9" presetID="1" presetClass="entr" presetSubtype="0" fill="hold" grpId="0" nodeType="withEffect">
+                                  <p:stCondLst>
+                                    <p:cond delay="0"/>
+                                  </p:stCondLst>
+                                  <p:childTnLst>
+                                    <p:set>
+                                      <p:cBhvr>
+                                        <p:cTn id="10" dur="1" fill="hold">
+                                          <p:stCondLst>
+                                            <p:cond delay="0"/>
+                                          </p:stCondLst>
+                                        </p:cTn>
+                                        <p:tgtEl>
+                                          <p:spTgt spid="3">
+                                            <p:txEl>
+                                              <p:pRg st="2" end="2"/>
+                                            </p:txEl>
+                                          </p:spTgt>
+                                        </p:tgtEl>
+                                        <p:attrNameLst>
+                                          <p:attrName>style.visibility</p:attrName>
+                                        </p:attrNameLst>
+                                      </p:cBhvr>
+                                      <p:to>
+                                        <p:strVal val="visible"/>
+                                      </p:to>
+                                    </p:set>
+                                  </p:childTnLst>
+                                </p:cTn>
+                              </p:par>
+                            </p:childTnLst>
+                          </p:cTn>
+                        </p:par>
+                      </p:childTnLst>
+                    </p:cTn>
+                  </p:par>
+                </p:childTnLst>
+              </p:cTn>
+              <p:prevCondLst>
+                <p:cond evt="onPrev" delay="0">
+                  <p:tgtEl>
+                    <p:sldTgt/>
+                  </p:tgtEl>
+                </p:cond>
+              </p:prevCondLst>
+              <p:nextCondLst>
+                <p:cond evt="onNext" delay="0">
+                  <p:tgtEl>
+                    <p:sldTgt/>
+                  </p:tgtEl>
+                </p:cond>
+              </p:nextCondLst>
+            </p:seq>
+          </p:childTnLst>
+        </p:cTn>
+      </p:par>
+    </p:tnLst>
+    <p:bldLst>
+      <p:bldP spid="3" grpId="0" build="p"/>
+    </p:bldLst>
+  </p:timing>
 </p:sld>
 </file>
 
@@ -15262,7 +15897,7 @@
           <a:p>
             <a:r>
               <a:rPr lang="en-US" dirty="0"/>
-              <a:t>User Stories</a:t>
+              <a:t>Requirements as User Stories</a:t>
             </a:r>
           </a:p>
         </p:txBody>
@@ -15285,12 +15920,14 @@
         </p:nvSpPr>
         <p:spPr/>
         <p:txBody>
-          <a:bodyPr/>
+          <a:bodyPr>
+            <a:normAutofit lnSpcReduction="10000"/>
+          </a:bodyPr>
           <a:lstStyle/>
           <a:p>
             <a:r>
               <a:rPr lang="en-US" dirty="0"/>
-              <a:t>Software features or capabilities</a:t>
+              <a:t>Describe software features or capabilities</a:t>
             </a:r>
             <a:r>
               <a:rPr lang="en-US" baseline="0" dirty="0"/>
@@ -15344,7 +15981,7 @@
             <a:pPr lvl="1"/>
             <a:r>
               <a:rPr lang="en-US" baseline="0" dirty="0"/>
-              <a:t>“As an administrator, I can add a new user”</a:t>
+              <a:t>“As an administrator, I can change the access rights of a user”</a:t>
             </a:r>
           </a:p>
           <a:p>
@@ -15379,7 +16016,13 @@
               <a:rPr lang="en-US" baseline="0" dirty="0"/>
               <a:t>”</a:t>
             </a:r>
-            <a:endParaRPr lang="en-US" dirty="0"/>
+          </a:p>
+          <a:p>
+            <a:pPr lvl="1"/>
+            <a:r>
+              <a:rPr lang="en-US" dirty="0"/>
+              <a:t>(Non-functional requirements may not become separate tasks)</a:t>
+            </a:r>
           </a:p>
         </p:txBody>
       </p:sp>
@@ -15393,6 +16036,434 @@
   <p:clrMapOvr>
     <a:masterClrMapping/>
   </p:clrMapOvr>
+  <p:timing>
+    <p:tnLst>
+      <p:par>
+        <p:cTn id="1" dur="indefinite" restart="never" nodeType="tmRoot">
+          <p:childTnLst>
+            <p:seq concurrent="1" nextAc="seek">
+              <p:cTn id="2" dur="indefinite" nodeType="mainSeq">
+                <p:childTnLst>
+                  <p:par>
+                    <p:cTn id="3" fill="hold">
+                      <p:stCondLst>
+                        <p:cond delay="indefinite"/>
+                      </p:stCondLst>
+                      <p:childTnLst>
+                        <p:par>
+                          <p:cTn id="4" fill="hold">
+                            <p:stCondLst>
+                              <p:cond delay="0"/>
+                            </p:stCondLst>
+                            <p:childTnLst>
+                              <p:par>
+                                <p:cTn id="5" presetID="1" presetClass="entr" presetSubtype="0" fill="hold" grpId="0" nodeType="clickEffect">
+                                  <p:stCondLst>
+                                    <p:cond delay="0"/>
+                                  </p:stCondLst>
+                                  <p:childTnLst>
+                                    <p:set>
+                                      <p:cBhvr>
+                                        <p:cTn id="6" dur="1" fill="hold">
+                                          <p:stCondLst>
+                                            <p:cond delay="0"/>
+                                          </p:stCondLst>
+                                        </p:cTn>
+                                        <p:tgtEl>
+                                          <p:spTgt spid="3">
+                                            <p:txEl>
+                                              <p:pRg st="0" end="0"/>
+                                            </p:txEl>
+                                          </p:spTgt>
+                                        </p:tgtEl>
+                                        <p:attrNameLst>
+                                          <p:attrName>style.visibility</p:attrName>
+                                        </p:attrNameLst>
+                                      </p:cBhvr>
+                                      <p:to>
+                                        <p:strVal val="visible"/>
+                                      </p:to>
+                                    </p:set>
+                                  </p:childTnLst>
+                                </p:cTn>
+                              </p:par>
+                              <p:par>
+                                <p:cTn id="7" presetID="1" presetClass="entr" presetSubtype="0" fill="hold" grpId="0" nodeType="withEffect">
+                                  <p:stCondLst>
+                                    <p:cond delay="0"/>
+                                  </p:stCondLst>
+                                  <p:childTnLst>
+                                    <p:set>
+                                      <p:cBhvr>
+                                        <p:cTn id="8" dur="1" fill="hold">
+                                          <p:stCondLst>
+                                            <p:cond delay="0"/>
+                                          </p:stCondLst>
+                                        </p:cTn>
+                                        <p:tgtEl>
+                                          <p:spTgt spid="3">
+                                            <p:txEl>
+                                              <p:pRg st="1" end="1"/>
+                                            </p:txEl>
+                                          </p:spTgt>
+                                        </p:tgtEl>
+                                        <p:attrNameLst>
+                                          <p:attrName>style.visibility</p:attrName>
+                                        </p:attrNameLst>
+                                      </p:cBhvr>
+                                      <p:to>
+                                        <p:strVal val="visible"/>
+                                      </p:to>
+                                    </p:set>
+                                  </p:childTnLst>
+                                </p:cTn>
+                              </p:par>
+                              <p:par>
+                                <p:cTn id="9" presetID="1" presetClass="entr" presetSubtype="0" fill="hold" grpId="0" nodeType="withEffect">
+                                  <p:stCondLst>
+                                    <p:cond delay="0"/>
+                                  </p:stCondLst>
+                                  <p:childTnLst>
+                                    <p:set>
+                                      <p:cBhvr>
+                                        <p:cTn id="10" dur="1" fill="hold">
+                                          <p:stCondLst>
+                                            <p:cond delay="0"/>
+                                          </p:stCondLst>
+                                        </p:cTn>
+                                        <p:tgtEl>
+                                          <p:spTgt spid="3">
+                                            <p:txEl>
+                                              <p:pRg st="2" end="2"/>
+                                            </p:txEl>
+                                          </p:spTgt>
+                                        </p:tgtEl>
+                                        <p:attrNameLst>
+                                          <p:attrName>style.visibility</p:attrName>
+                                        </p:attrNameLst>
+                                      </p:cBhvr>
+                                      <p:to>
+                                        <p:strVal val="visible"/>
+                                      </p:to>
+                                    </p:set>
+                                  </p:childTnLst>
+                                </p:cTn>
+                              </p:par>
+                            </p:childTnLst>
+                          </p:cTn>
+                        </p:par>
+                      </p:childTnLst>
+                    </p:cTn>
+                  </p:par>
+                  <p:par>
+                    <p:cTn id="11" fill="hold">
+                      <p:stCondLst>
+                        <p:cond delay="indefinite"/>
+                      </p:stCondLst>
+                      <p:childTnLst>
+                        <p:par>
+                          <p:cTn id="12" fill="hold">
+                            <p:stCondLst>
+                              <p:cond delay="0"/>
+                            </p:stCondLst>
+                            <p:childTnLst>
+                              <p:par>
+                                <p:cTn id="13" presetID="1" presetClass="entr" presetSubtype="0" fill="hold" grpId="0" nodeType="clickEffect">
+                                  <p:stCondLst>
+                                    <p:cond delay="0"/>
+                                  </p:stCondLst>
+                                  <p:childTnLst>
+                                    <p:set>
+                                      <p:cBhvr>
+                                        <p:cTn id="14" dur="1" fill="hold">
+                                          <p:stCondLst>
+                                            <p:cond delay="0"/>
+                                          </p:stCondLst>
+                                        </p:cTn>
+                                        <p:tgtEl>
+                                          <p:spTgt spid="3">
+                                            <p:txEl>
+                                              <p:pRg st="3" end="3"/>
+                                            </p:txEl>
+                                          </p:spTgt>
+                                        </p:tgtEl>
+                                        <p:attrNameLst>
+                                          <p:attrName>style.visibility</p:attrName>
+                                        </p:attrNameLst>
+                                      </p:cBhvr>
+                                      <p:to>
+                                        <p:strVal val="visible"/>
+                                      </p:to>
+                                    </p:set>
+                                  </p:childTnLst>
+                                </p:cTn>
+                              </p:par>
+                              <p:par>
+                                <p:cTn id="15" presetID="1" presetClass="entr" presetSubtype="0" fill="hold" grpId="0" nodeType="withEffect">
+                                  <p:stCondLst>
+                                    <p:cond delay="0"/>
+                                  </p:stCondLst>
+                                  <p:childTnLst>
+                                    <p:set>
+                                      <p:cBhvr>
+                                        <p:cTn id="16" dur="1" fill="hold">
+                                          <p:stCondLst>
+                                            <p:cond delay="0"/>
+                                          </p:stCondLst>
+                                        </p:cTn>
+                                        <p:tgtEl>
+                                          <p:spTgt spid="3">
+                                            <p:txEl>
+                                              <p:pRg st="4" end="4"/>
+                                            </p:txEl>
+                                          </p:spTgt>
+                                        </p:tgtEl>
+                                        <p:attrNameLst>
+                                          <p:attrName>style.visibility</p:attrName>
+                                        </p:attrNameLst>
+                                      </p:cBhvr>
+                                      <p:to>
+                                        <p:strVal val="visible"/>
+                                      </p:to>
+                                    </p:set>
+                                  </p:childTnLst>
+                                </p:cTn>
+                              </p:par>
+                              <p:par>
+                                <p:cTn id="17" presetID="1" presetClass="entr" presetSubtype="0" fill="hold" grpId="0" nodeType="withEffect">
+                                  <p:stCondLst>
+                                    <p:cond delay="0"/>
+                                  </p:stCondLst>
+                                  <p:childTnLst>
+                                    <p:set>
+                                      <p:cBhvr>
+                                        <p:cTn id="18" dur="1" fill="hold">
+                                          <p:stCondLst>
+                                            <p:cond delay="0"/>
+                                          </p:stCondLst>
+                                        </p:cTn>
+                                        <p:tgtEl>
+                                          <p:spTgt spid="3">
+                                            <p:txEl>
+                                              <p:pRg st="5" end="5"/>
+                                            </p:txEl>
+                                          </p:spTgt>
+                                        </p:tgtEl>
+                                        <p:attrNameLst>
+                                          <p:attrName>style.visibility</p:attrName>
+                                        </p:attrNameLst>
+                                      </p:cBhvr>
+                                      <p:to>
+                                        <p:strVal val="visible"/>
+                                      </p:to>
+                                    </p:set>
+                                  </p:childTnLst>
+                                </p:cTn>
+                              </p:par>
+                              <p:par>
+                                <p:cTn id="19" presetID="1" presetClass="entr" presetSubtype="0" fill="hold" grpId="0" nodeType="withEffect">
+                                  <p:stCondLst>
+                                    <p:cond delay="0"/>
+                                  </p:stCondLst>
+                                  <p:childTnLst>
+                                    <p:set>
+                                      <p:cBhvr>
+                                        <p:cTn id="20" dur="1" fill="hold">
+                                          <p:stCondLst>
+                                            <p:cond delay="0"/>
+                                          </p:stCondLst>
+                                        </p:cTn>
+                                        <p:tgtEl>
+                                          <p:spTgt spid="3">
+                                            <p:txEl>
+                                              <p:pRg st="6" end="6"/>
+                                            </p:txEl>
+                                          </p:spTgt>
+                                        </p:tgtEl>
+                                        <p:attrNameLst>
+                                          <p:attrName>style.visibility</p:attrName>
+                                        </p:attrNameLst>
+                                      </p:cBhvr>
+                                      <p:to>
+                                        <p:strVal val="visible"/>
+                                      </p:to>
+                                    </p:set>
+                                  </p:childTnLst>
+                                </p:cTn>
+                              </p:par>
+                            </p:childTnLst>
+                          </p:cTn>
+                        </p:par>
+                      </p:childTnLst>
+                    </p:cTn>
+                  </p:par>
+                  <p:par>
+                    <p:cTn id="21" fill="hold">
+                      <p:stCondLst>
+                        <p:cond delay="indefinite"/>
+                      </p:stCondLst>
+                      <p:childTnLst>
+                        <p:par>
+                          <p:cTn id="22" fill="hold">
+                            <p:stCondLst>
+                              <p:cond delay="0"/>
+                            </p:stCondLst>
+                            <p:childTnLst>
+                              <p:par>
+                                <p:cTn id="23" presetID="1" presetClass="entr" presetSubtype="0" fill="hold" grpId="0" nodeType="clickEffect">
+                                  <p:stCondLst>
+                                    <p:cond delay="0"/>
+                                  </p:stCondLst>
+                                  <p:childTnLst>
+                                    <p:set>
+                                      <p:cBhvr>
+                                        <p:cTn id="24" dur="1" fill="hold">
+                                          <p:stCondLst>
+                                            <p:cond delay="0"/>
+                                          </p:stCondLst>
+                                        </p:cTn>
+                                        <p:tgtEl>
+                                          <p:spTgt spid="3">
+                                            <p:txEl>
+                                              <p:pRg st="7" end="7"/>
+                                            </p:txEl>
+                                          </p:spTgt>
+                                        </p:tgtEl>
+                                        <p:attrNameLst>
+                                          <p:attrName>style.visibility</p:attrName>
+                                        </p:attrNameLst>
+                                      </p:cBhvr>
+                                      <p:to>
+                                        <p:strVal val="visible"/>
+                                      </p:to>
+                                    </p:set>
+                                  </p:childTnLst>
+                                </p:cTn>
+                              </p:par>
+                              <p:par>
+                                <p:cTn id="25" presetID="1" presetClass="entr" presetSubtype="0" fill="hold" grpId="0" nodeType="withEffect">
+                                  <p:stCondLst>
+                                    <p:cond delay="0"/>
+                                  </p:stCondLst>
+                                  <p:childTnLst>
+                                    <p:set>
+                                      <p:cBhvr>
+                                        <p:cTn id="26" dur="1" fill="hold">
+                                          <p:stCondLst>
+                                            <p:cond delay="0"/>
+                                          </p:stCondLst>
+                                        </p:cTn>
+                                        <p:tgtEl>
+                                          <p:spTgt spid="3">
+                                            <p:txEl>
+                                              <p:pRg st="8" end="8"/>
+                                            </p:txEl>
+                                          </p:spTgt>
+                                        </p:tgtEl>
+                                        <p:attrNameLst>
+                                          <p:attrName>style.visibility</p:attrName>
+                                        </p:attrNameLst>
+                                      </p:cBhvr>
+                                      <p:to>
+                                        <p:strVal val="visible"/>
+                                      </p:to>
+                                    </p:set>
+                                  </p:childTnLst>
+                                </p:cTn>
+                              </p:par>
+                              <p:par>
+                                <p:cTn id="27" presetID="1" presetClass="entr" presetSubtype="0" fill="hold" grpId="0" nodeType="withEffect">
+                                  <p:stCondLst>
+                                    <p:cond delay="0"/>
+                                  </p:stCondLst>
+                                  <p:childTnLst>
+                                    <p:set>
+                                      <p:cBhvr>
+                                        <p:cTn id="28" dur="1" fill="hold">
+                                          <p:stCondLst>
+                                            <p:cond delay="0"/>
+                                          </p:stCondLst>
+                                        </p:cTn>
+                                        <p:tgtEl>
+                                          <p:spTgt spid="3">
+                                            <p:txEl>
+                                              <p:pRg st="9" end="9"/>
+                                            </p:txEl>
+                                          </p:spTgt>
+                                        </p:tgtEl>
+                                        <p:attrNameLst>
+                                          <p:attrName>style.visibility</p:attrName>
+                                        </p:attrNameLst>
+                                      </p:cBhvr>
+                                      <p:to>
+                                        <p:strVal val="visible"/>
+                                      </p:to>
+                                    </p:set>
+                                  </p:childTnLst>
+                                </p:cTn>
+                              </p:par>
+                              <p:par>
+                                <p:cTn id="29" presetID="1" presetClass="entr" presetSubtype="0" fill="hold" grpId="0" nodeType="withEffect">
+                                  <p:stCondLst>
+                                    <p:cond delay="0"/>
+                                  </p:stCondLst>
+                                  <p:childTnLst>
+                                    <p:set>
+                                      <p:cBhvr>
+                                        <p:cTn id="30" dur="1" fill="hold">
+                                          <p:stCondLst>
+                                            <p:cond delay="0"/>
+                                          </p:stCondLst>
+                                        </p:cTn>
+                                        <p:tgtEl>
+                                          <p:spTgt spid="3">
+                                            <p:txEl>
+                                              <p:pRg st="10" end="10"/>
+                                            </p:txEl>
+                                          </p:spTgt>
+                                        </p:tgtEl>
+                                        <p:attrNameLst>
+                                          <p:attrName>style.visibility</p:attrName>
+                                        </p:attrNameLst>
+                                      </p:cBhvr>
+                                      <p:to>
+                                        <p:strVal val="visible"/>
+                                      </p:to>
+                                    </p:set>
+                                  </p:childTnLst>
+                                </p:cTn>
+                              </p:par>
+                            </p:childTnLst>
+                          </p:cTn>
+                        </p:par>
+                      </p:childTnLst>
+                    </p:cTn>
+                  </p:par>
+                </p:childTnLst>
+              </p:cTn>
+              <p:prevCondLst>
+                <p:cond evt="onPrev" delay="0">
+                  <p:tgtEl>
+                    <p:sldTgt/>
+                  </p:tgtEl>
+                </p:cond>
+              </p:prevCondLst>
+              <p:nextCondLst>
+                <p:cond evt="onNext" delay="0">
+                  <p:tgtEl>
+                    <p:sldTgt/>
+                  </p:tgtEl>
+                </p:cond>
+              </p:nextCondLst>
+            </p:seq>
+          </p:childTnLst>
+        </p:cTn>
+      </p:par>
+    </p:tnLst>
+    <p:bldLst>
+      <p:bldP spid="3" grpId="0" build="p"/>
+    </p:bldLst>
+  </p:timing>
 </p:sld>
 </file>
 
@@ -15520,6 +16591,297 @@
   <p:clrMapOvr>
     <a:masterClrMapping/>
   </p:clrMapOvr>
+  <p:timing>
+    <p:tnLst>
+      <p:par>
+        <p:cTn id="1" dur="indefinite" restart="never" nodeType="tmRoot">
+          <p:childTnLst>
+            <p:seq concurrent="1" nextAc="seek">
+              <p:cTn id="2" dur="indefinite" nodeType="mainSeq">
+                <p:childTnLst>
+                  <p:par>
+                    <p:cTn id="3" fill="hold">
+                      <p:stCondLst>
+                        <p:cond delay="indefinite"/>
+                      </p:stCondLst>
+                      <p:childTnLst>
+                        <p:par>
+                          <p:cTn id="4" fill="hold">
+                            <p:stCondLst>
+                              <p:cond delay="0"/>
+                            </p:stCondLst>
+                            <p:childTnLst>
+                              <p:par>
+                                <p:cTn id="5" presetID="1" presetClass="entr" presetSubtype="0" fill="hold" grpId="0" nodeType="clickEffect">
+                                  <p:stCondLst>
+                                    <p:cond delay="0"/>
+                                  </p:stCondLst>
+                                  <p:childTnLst>
+                                    <p:set>
+                                      <p:cBhvr>
+                                        <p:cTn id="6" dur="1" fill="hold">
+                                          <p:stCondLst>
+                                            <p:cond delay="0"/>
+                                          </p:stCondLst>
+                                        </p:cTn>
+                                        <p:tgtEl>
+                                          <p:spTgt spid="3">
+                                            <p:txEl>
+                                              <p:pRg st="0" end="0"/>
+                                            </p:txEl>
+                                          </p:spTgt>
+                                        </p:tgtEl>
+                                        <p:attrNameLst>
+                                          <p:attrName>style.visibility</p:attrName>
+                                        </p:attrNameLst>
+                                      </p:cBhvr>
+                                      <p:to>
+                                        <p:strVal val="visible"/>
+                                      </p:to>
+                                    </p:set>
+                                  </p:childTnLst>
+                                </p:cTn>
+                              </p:par>
+                            </p:childTnLst>
+                          </p:cTn>
+                        </p:par>
+                      </p:childTnLst>
+                    </p:cTn>
+                  </p:par>
+                  <p:par>
+                    <p:cTn id="7" fill="hold">
+                      <p:stCondLst>
+                        <p:cond delay="indefinite"/>
+                      </p:stCondLst>
+                      <p:childTnLst>
+                        <p:par>
+                          <p:cTn id="8" fill="hold">
+                            <p:stCondLst>
+                              <p:cond delay="0"/>
+                            </p:stCondLst>
+                            <p:childTnLst>
+                              <p:par>
+                                <p:cTn id="9" presetID="1" presetClass="entr" presetSubtype="0" fill="hold" grpId="0" nodeType="clickEffect">
+                                  <p:stCondLst>
+                                    <p:cond delay="0"/>
+                                  </p:stCondLst>
+                                  <p:childTnLst>
+                                    <p:set>
+                                      <p:cBhvr>
+                                        <p:cTn id="10" dur="1" fill="hold">
+                                          <p:stCondLst>
+                                            <p:cond delay="0"/>
+                                          </p:stCondLst>
+                                        </p:cTn>
+                                        <p:tgtEl>
+                                          <p:spTgt spid="3">
+                                            <p:txEl>
+                                              <p:pRg st="1" end="1"/>
+                                            </p:txEl>
+                                          </p:spTgt>
+                                        </p:tgtEl>
+                                        <p:attrNameLst>
+                                          <p:attrName>style.visibility</p:attrName>
+                                        </p:attrNameLst>
+                                      </p:cBhvr>
+                                      <p:to>
+                                        <p:strVal val="visible"/>
+                                      </p:to>
+                                    </p:set>
+                                  </p:childTnLst>
+                                </p:cTn>
+                              </p:par>
+                              <p:par>
+                                <p:cTn id="11" presetID="1" presetClass="entr" presetSubtype="0" fill="hold" grpId="0" nodeType="withEffect">
+                                  <p:stCondLst>
+                                    <p:cond delay="0"/>
+                                  </p:stCondLst>
+                                  <p:childTnLst>
+                                    <p:set>
+                                      <p:cBhvr>
+                                        <p:cTn id="12" dur="1" fill="hold">
+                                          <p:stCondLst>
+                                            <p:cond delay="0"/>
+                                          </p:stCondLst>
+                                        </p:cTn>
+                                        <p:tgtEl>
+                                          <p:spTgt spid="3">
+                                            <p:txEl>
+                                              <p:pRg st="2" end="2"/>
+                                            </p:txEl>
+                                          </p:spTgt>
+                                        </p:tgtEl>
+                                        <p:attrNameLst>
+                                          <p:attrName>style.visibility</p:attrName>
+                                        </p:attrNameLst>
+                                      </p:cBhvr>
+                                      <p:to>
+                                        <p:strVal val="visible"/>
+                                      </p:to>
+                                    </p:set>
+                                  </p:childTnLst>
+                                </p:cTn>
+                              </p:par>
+                              <p:par>
+                                <p:cTn id="13" presetID="1" presetClass="entr" presetSubtype="0" fill="hold" grpId="0" nodeType="withEffect">
+                                  <p:stCondLst>
+                                    <p:cond delay="0"/>
+                                  </p:stCondLst>
+                                  <p:childTnLst>
+                                    <p:set>
+                                      <p:cBhvr>
+                                        <p:cTn id="14" dur="1" fill="hold">
+                                          <p:stCondLst>
+                                            <p:cond delay="0"/>
+                                          </p:stCondLst>
+                                        </p:cTn>
+                                        <p:tgtEl>
+                                          <p:spTgt spid="3">
+                                            <p:txEl>
+                                              <p:pRg st="3" end="3"/>
+                                            </p:txEl>
+                                          </p:spTgt>
+                                        </p:tgtEl>
+                                        <p:attrNameLst>
+                                          <p:attrName>style.visibility</p:attrName>
+                                        </p:attrNameLst>
+                                      </p:cBhvr>
+                                      <p:to>
+                                        <p:strVal val="visible"/>
+                                      </p:to>
+                                    </p:set>
+                                  </p:childTnLst>
+                                </p:cTn>
+                              </p:par>
+                            </p:childTnLst>
+                          </p:cTn>
+                        </p:par>
+                      </p:childTnLst>
+                    </p:cTn>
+                  </p:par>
+                  <p:par>
+                    <p:cTn id="15" fill="hold">
+                      <p:stCondLst>
+                        <p:cond delay="indefinite"/>
+                      </p:stCondLst>
+                      <p:childTnLst>
+                        <p:par>
+                          <p:cTn id="16" fill="hold">
+                            <p:stCondLst>
+                              <p:cond delay="0"/>
+                            </p:stCondLst>
+                            <p:childTnLst>
+                              <p:par>
+                                <p:cTn id="17" presetID="1" presetClass="entr" presetSubtype="0" fill="hold" grpId="0" nodeType="clickEffect">
+                                  <p:stCondLst>
+                                    <p:cond delay="0"/>
+                                  </p:stCondLst>
+                                  <p:childTnLst>
+                                    <p:set>
+                                      <p:cBhvr>
+                                        <p:cTn id="18" dur="1" fill="hold">
+                                          <p:stCondLst>
+                                            <p:cond delay="0"/>
+                                          </p:stCondLst>
+                                        </p:cTn>
+                                        <p:tgtEl>
+                                          <p:spTgt spid="3">
+                                            <p:txEl>
+                                              <p:pRg st="4" end="4"/>
+                                            </p:txEl>
+                                          </p:spTgt>
+                                        </p:tgtEl>
+                                        <p:attrNameLst>
+                                          <p:attrName>style.visibility</p:attrName>
+                                        </p:attrNameLst>
+                                      </p:cBhvr>
+                                      <p:to>
+                                        <p:strVal val="visible"/>
+                                      </p:to>
+                                    </p:set>
+                                  </p:childTnLst>
+                                </p:cTn>
+                              </p:par>
+                            </p:childTnLst>
+                          </p:cTn>
+                        </p:par>
+                      </p:childTnLst>
+                    </p:cTn>
+                  </p:par>
+                  <p:par>
+                    <p:cTn id="19" fill="hold">
+                      <p:stCondLst>
+                        <p:cond delay="indefinite"/>
+                      </p:stCondLst>
+                      <p:childTnLst>
+                        <p:par>
+                          <p:cTn id="20" fill="hold">
+                            <p:stCondLst>
+                              <p:cond delay="0"/>
+                            </p:stCondLst>
+                            <p:childTnLst>
+                              <p:par>
+                                <p:cTn id="21" presetID="1" presetClass="entr" presetSubtype="0" fill="hold" grpId="0" nodeType="clickEffect">
+                                  <p:stCondLst>
+                                    <p:cond delay="0"/>
+                                  </p:stCondLst>
+                                  <p:childTnLst>
+                                    <p:set>
+                                      <p:cBhvr>
+                                        <p:cTn id="22" dur="1" fill="hold">
+                                          <p:stCondLst>
+                                            <p:cond delay="0"/>
+                                          </p:stCondLst>
+                                        </p:cTn>
+                                        <p:tgtEl>
+                                          <p:spTgt spid="3">
+                                            <p:txEl>
+                                              <p:pRg st="5" end="5"/>
+                                            </p:txEl>
+                                          </p:spTgt>
+                                        </p:tgtEl>
+                                        <p:attrNameLst>
+                                          <p:attrName>style.visibility</p:attrName>
+                                        </p:attrNameLst>
+                                      </p:cBhvr>
+                                      <p:to>
+                                        <p:strVal val="visible"/>
+                                      </p:to>
+                                    </p:set>
+                                  </p:childTnLst>
+                                </p:cTn>
+                              </p:par>
+                            </p:childTnLst>
+                          </p:cTn>
+                        </p:par>
+                      </p:childTnLst>
+                    </p:cTn>
+                  </p:par>
+                </p:childTnLst>
+              </p:cTn>
+              <p:prevCondLst>
+                <p:cond evt="onPrev" delay="0">
+                  <p:tgtEl>
+                    <p:sldTgt/>
+                  </p:tgtEl>
+                </p:cond>
+              </p:prevCondLst>
+              <p:nextCondLst>
+                <p:cond evt="onNext" delay="0">
+                  <p:tgtEl>
+                    <p:sldTgt/>
+                  </p:tgtEl>
+                </p:cond>
+              </p:nextCondLst>
+            </p:seq>
+          </p:childTnLst>
+        </p:cTn>
+      </p:par>
+    </p:tnLst>
+    <p:bldLst>
+      <p:bldP spid="3" grpId="0" build="p"/>
+    </p:bldLst>
+  </p:timing>
 </p:sld>
 </file>
 
@@ -15624,14 +16986,18 @@
             </a:r>
             <a:r>
               <a:rPr lang="en-US" baseline="0" dirty="0"/>
-              <a:t> software release/next sprint</a:t>
+              <a:t> software release/sprint</a:t>
             </a:r>
           </a:p>
           <a:p>
             <a:pPr lvl="1"/>
             <a:r>
-              <a:rPr lang="en-US" dirty="0"/>
-              <a:t>Must have</a:t>
+              <a:rPr lang="en-US" b="1" dirty="0"/>
+              <a:t>M</a:t>
+            </a:r>
+            <a:r>
+              <a:rPr lang="en-US" dirty="0"/>
+              <a:t>ust have</a:t>
             </a:r>
           </a:p>
           <a:p>
@@ -15644,8 +17010,12 @@
           <a:p>
             <a:pPr lvl="1"/>
             <a:r>
-              <a:rPr lang="en-US" dirty="0"/>
-              <a:t>Should have</a:t>
+              <a:rPr lang="en-US" b="1" dirty="0"/>
+              <a:t>S</a:t>
+            </a:r>
+            <a:r>
+              <a:rPr lang="en-US" dirty="0"/>
+              <a:t>hould have</a:t>
             </a:r>
           </a:p>
           <a:p>
@@ -15658,8 +17028,12 @@
           <a:p>
             <a:pPr lvl="1"/>
             <a:r>
-              <a:rPr lang="en-US" dirty="0"/>
-              <a:t>Could have</a:t>
+              <a:rPr lang="en-US" b="1" dirty="0"/>
+              <a:t>C</a:t>
+            </a:r>
+            <a:r>
+              <a:rPr lang="en-US" dirty="0"/>
+              <a:t>ould have</a:t>
             </a:r>
           </a:p>
           <a:p>
@@ -15672,8 +17046,12 @@
           <a:p>
             <a:pPr lvl="1"/>
             <a:r>
-              <a:rPr lang="en-US" dirty="0"/>
-              <a:t>Won’t have</a:t>
+              <a:rPr lang="en-US" b="1" dirty="0"/>
+              <a:t>W</a:t>
+            </a:r>
+            <a:r>
+              <a:rPr lang="en-US" dirty="0"/>
+              <a:t>on’t have</a:t>
             </a:r>
           </a:p>
           <a:p>
@@ -15707,6 +17085,604 @@
   <p:clrMapOvr>
     <a:masterClrMapping/>
   </p:clrMapOvr>
+  <p:timing>
+    <p:tnLst>
+      <p:par>
+        <p:cTn id="1" dur="indefinite" restart="never" nodeType="tmRoot">
+          <p:childTnLst>
+            <p:seq concurrent="1" nextAc="seek">
+              <p:cTn id="2" dur="indefinite" nodeType="mainSeq">
+                <p:childTnLst>
+                  <p:par>
+                    <p:cTn id="3" fill="hold">
+                      <p:stCondLst>
+                        <p:cond delay="indefinite"/>
+                      </p:stCondLst>
+                      <p:childTnLst>
+                        <p:par>
+                          <p:cTn id="4" fill="hold">
+                            <p:stCondLst>
+                              <p:cond delay="0"/>
+                            </p:stCondLst>
+                            <p:childTnLst>
+                              <p:par>
+                                <p:cTn id="5" presetID="1" presetClass="entr" presetSubtype="0" fill="hold" grpId="0" nodeType="clickEffect">
+                                  <p:stCondLst>
+                                    <p:cond delay="0"/>
+                                  </p:stCondLst>
+                                  <p:childTnLst>
+                                    <p:set>
+                                      <p:cBhvr>
+                                        <p:cTn id="6" dur="1" fill="hold">
+                                          <p:stCondLst>
+                                            <p:cond delay="0"/>
+                                          </p:stCondLst>
+                                        </p:cTn>
+                                        <p:tgtEl>
+                                          <p:spTgt spid="3">
+                                            <p:txEl>
+                                              <p:pRg st="0" end="0"/>
+                                            </p:txEl>
+                                          </p:spTgt>
+                                        </p:tgtEl>
+                                        <p:attrNameLst>
+                                          <p:attrName>style.visibility</p:attrName>
+                                        </p:attrNameLst>
+                                      </p:cBhvr>
+                                      <p:to>
+                                        <p:strVal val="visible"/>
+                                      </p:to>
+                                    </p:set>
+                                  </p:childTnLst>
+                                </p:cTn>
+                              </p:par>
+                            </p:childTnLst>
+                          </p:cTn>
+                        </p:par>
+                      </p:childTnLst>
+                    </p:cTn>
+                  </p:par>
+                  <p:par>
+                    <p:cTn id="7" fill="hold">
+                      <p:stCondLst>
+                        <p:cond delay="indefinite"/>
+                      </p:stCondLst>
+                      <p:childTnLst>
+                        <p:par>
+                          <p:cTn id="8" fill="hold">
+                            <p:stCondLst>
+                              <p:cond delay="0"/>
+                            </p:stCondLst>
+                            <p:childTnLst>
+                              <p:par>
+                                <p:cTn id="9" presetID="1" presetClass="entr" presetSubtype="0" fill="hold" grpId="0" nodeType="clickEffect">
+                                  <p:stCondLst>
+                                    <p:cond delay="0"/>
+                                  </p:stCondLst>
+                                  <p:childTnLst>
+                                    <p:set>
+                                      <p:cBhvr>
+                                        <p:cTn id="10" dur="1" fill="hold">
+                                          <p:stCondLst>
+                                            <p:cond delay="0"/>
+                                          </p:stCondLst>
+                                        </p:cTn>
+                                        <p:tgtEl>
+                                          <p:spTgt spid="3">
+                                            <p:txEl>
+                                              <p:pRg st="1" end="1"/>
+                                            </p:txEl>
+                                          </p:spTgt>
+                                        </p:tgtEl>
+                                        <p:attrNameLst>
+                                          <p:attrName>style.visibility</p:attrName>
+                                        </p:attrNameLst>
+                                      </p:cBhvr>
+                                      <p:to>
+                                        <p:strVal val="visible"/>
+                                      </p:to>
+                                    </p:set>
+                                  </p:childTnLst>
+                                </p:cTn>
+                              </p:par>
+                            </p:childTnLst>
+                          </p:cTn>
+                        </p:par>
+                      </p:childTnLst>
+                    </p:cTn>
+                  </p:par>
+                  <p:par>
+                    <p:cTn id="11" fill="hold">
+                      <p:stCondLst>
+                        <p:cond delay="indefinite"/>
+                      </p:stCondLst>
+                      <p:childTnLst>
+                        <p:par>
+                          <p:cTn id="12" fill="hold">
+                            <p:stCondLst>
+                              <p:cond delay="0"/>
+                            </p:stCondLst>
+                            <p:childTnLst>
+                              <p:par>
+                                <p:cTn id="13" presetID="1" presetClass="entr" presetSubtype="0" fill="hold" grpId="0" nodeType="clickEffect">
+                                  <p:stCondLst>
+                                    <p:cond delay="0"/>
+                                  </p:stCondLst>
+                                  <p:childTnLst>
+                                    <p:set>
+                                      <p:cBhvr>
+                                        <p:cTn id="14" dur="1" fill="hold">
+                                          <p:stCondLst>
+                                            <p:cond delay="0"/>
+                                          </p:stCondLst>
+                                        </p:cTn>
+                                        <p:tgtEl>
+                                          <p:spTgt spid="3">
+                                            <p:txEl>
+                                              <p:pRg st="2" end="2"/>
+                                            </p:txEl>
+                                          </p:spTgt>
+                                        </p:tgtEl>
+                                        <p:attrNameLst>
+                                          <p:attrName>style.visibility</p:attrName>
+                                        </p:attrNameLst>
+                                      </p:cBhvr>
+                                      <p:to>
+                                        <p:strVal val="visible"/>
+                                      </p:to>
+                                    </p:set>
+                                  </p:childTnLst>
+                                </p:cTn>
+                              </p:par>
+                            </p:childTnLst>
+                          </p:cTn>
+                        </p:par>
+                      </p:childTnLst>
+                    </p:cTn>
+                  </p:par>
+                  <p:par>
+                    <p:cTn id="15" fill="hold">
+                      <p:stCondLst>
+                        <p:cond delay="indefinite"/>
+                      </p:stCondLst>
+                      <p:childTnLst>
+                        <p:par>
+                          <p:cTn id="16" fill="hold">
+                            <p:stCondLst>
+                              <p:cond delay="0"/>
+                            </p:stCondLst>
+                            <p:childTnLst>
+                              <p:par>
+                                <p:cTn id="17" presetID="1" presetClass="entr" presetSubtype="0" fill="hold" grpId="0" nodeType="clickEffect">
+                                  <p:stCondLst>
+                                    <p:cond delay="0"/>
+                                  </p:stCondLst>
+                                  <p:childTnLst>
+                                    <p:set>
+                                      <p:cBhvr>
+                                        <p:cTn id="18" dur="1" fill="hold">
+                                          <p:stCondLst>
+                                            <p:cond delay="0"/>
+                                          </p:stCondLst>
+                                        </p:cTn>
+                                        <p:tgtEl>
+                                          <p:spTgt spid="3">
+                                            <p:txEl>
+                                              <p:pRg st="3" end="3"/>
+                                            </p:txEl>
+                                          </p:spTgt>
+                                        </p:tgtEl>
+                                        <p:attrNameLst>
+                                          <p:attrName>style.visibility</p:attrName>
+                                        </p:attrNameLst>
+                                      </p:cBhvr>
+                                      <p:to>
+                                        <p:strVal val="visible"/>
+                                      </p:to>
+                                    </p:set>
+                                  </p:childTnLst>
+                                </p:cTn>
+                              </p:par>
+                              <p:par>
+                                <p:cTn id="19" presetID="1" presetClass="entr" presetSubtype="0" fill="hold" grpId="0" nodeType="withEffect">
+                                  <p:stCondLst>
+                                    <p:cond delay="0"/>
+                                  </p:stCondLst>
+                                  <p:childTnLst>
+                                    <p:set>
+                                      <p:cBhvr>
+                                        <p:cTn id="20" dur="1" fill="hold">
+                                          <p:stCondLst>
+                                            <p:cond delay="0"/>
+                                          </p:stCondLst>
+                                        </p:cTn>
+                                        <p:tgtEl>
+                                          <p:spTgt spid="3">
+                                            <p:txEl>
+                                              <p:pRg st="4" end="4"/>
+                                            </p:txEl>
+                                          </p:spTgt>
+                                        </p:tgtEl>
+                                        <p:attrNameLst>
+                                          <p:attrName>style.visibility</p:attrName>
+                                        </p:attrNameLst>
+                                      </p:cBhvr>
+                                      <p:to>
+                                        <p:strVal val="visible"/>
+                                      </p:to>
+                                    </p:set>
+                                  </p:childTnLst>
+                                </p:cTn>
+                              </p:par>
+                            </p:childTnLst>
+                          </p:cTn>
+                        </p:par>
+                      </p:childTnLst>
+                    </p:cTn>
+                  </p:par>
+                  <p:par>
+                    <p:cTn id="21" fill="hold">
+                      <p:stCondLst>
+                        <p:cond delay="indefinite"/>
+                      </p:stCondLst>
+                      <p:childTnLst>
+                        <p:par>
+                          <p:cTn id="22" fill="hold">
+                            <p:stCondLst>
+                              <p:cond delay="0"/>
+                            </p:stCondLst>
+                            <p:childTnLst>
+                              <p:par>
+                                <p:cTn id="23" presetID="1" presetClass="entr" presetSubtype="0" fill="hold" grpId="0" nodeType="clickEffect">
+                                  <p:stCondLst>
+                                    <p:cond delay="0"/>
+                                  </p:stCondLst>
+                                  <p:childTnLst>
+                                    <p:set>
+                                      <p:cBhvr>
+                                        <p:cTn id="24" dur="1" fill="hold">
+                                          <p:stCondLst>
+                                            <p:cond delay="0"/>
+                                          </p:stCondLst>
+                                        </p:cTn>
+                                        <p:tgtEl>
+                                          <p:spTgt spid="3">
+                                            <p:txEl>
+                                              <p:pRg st="5" end="5"/>
+                                            </p:txEl>
+                                          </p:spTgt>
+                                        </p:tgtEl>
+                                        <p:attrNameLst>
+                                          <p:attrName>style.visibility</p:attrName>
+                                        </p:attrNameLst>
+                                      </p:cBhvr>
+                                      <p:to>
+                                        <p:strVal val="visible"/>
+                                      </p:to>
+                                    </p:set>
+                                  </p:childTnLst>
+                                </p:cTn>
+                              </p:par>
+                              <p:par>
+                                <p:cTn id="25" presetID="1" presetClass="entr" presetSubtype="0" fill="hold" grpId="0" nodeType="withEffect">
+                                  <p:stCondLst>
+                                    <p:cond delay="0"/>
+                                  </p:stCondLst>
+                                  <p:childTnLst>
+                                    <p:set>
+                                      <p:cBhvr>
+                                        <p:cTn id="26" dur="1" fill="hold">
+                                          <p:stCondLst>
+                                            <p:cond delay="0"/>
+                                          </p:stCondLst>
+                                        </p:cTn>
+                                        <p:tgtEl>
+                                          <p:spTgt spid="3">
+                                            <p:txEl>
+                                              <p:pRg st="6" end="6"/>
+                                            </p:txEl>
+                                          </p:spTgt>
+                                        </p:tgtEl>
+                                        <p:attrNameLst>
+                                          <p:attrName>style.visibility</p:attrName>
+                                        </p:attrNameLst>
+                                      </p:cBhvr>
+                                      <p:to>
+                                        <p:strVal val="visible"/>
+                                      </p:to>
+                                    </p:set>
+                                  </p:childTnLst>
+                                </p:cTn>
+                              </p:par>
+                            </p:childTnLst>
+                          </p:cTn>
+                        </p:par>
+                      </p:childTnLst>
+                    </p:cTn>
+                  </p:par>
+                  <p:par>
+                    <p:cTn id="27" fill="hold">
+                      <p:stCondLst>
+                        <p:cond delay="indefinite"/>
+                      </p:stCondLst>
+                      <p:childTnLst>
+                        <p:par>
+                          <p:cTn id="28" fill="hold">
+                            <p:stCondLst>
+                              <p:cond delay="0"/>
+                            </p:stCondLst>
+                            <p:childTnLst>
+                              <p:par>
+                                <p:cTn id="29" presetID="1" presetClass="entr" presetSubtype="0" fill="hold" grpId="0" nodeType="clickEffect">
+                                  <p:stCondLst>
+                                    <p:cond delay="0"/>
+                                  </p:stCondLst>
+                                  <p:childTnLst>
+                                    <p:set>
+                                      <p:cBhvr>
+                                        <p:cTn id="30" dur="1" fill="hold">
+                                          <p:stCondLst>
+                                            <p:cond delay="0"/>
+                                          </p:stCondLst>
+                                        </p:cTn>
+                                        <p:tgtEl>
+                                          <p:spTgt spid="3">
+                                            <p:txEl>
+                                              <p:pRg st="7" end="7"/>
+                                            </p:txEl>
+                                          </p:spTgt>
+                                        </p:tgtEl>
+                                        <p:attrNameLst>
+                                          <p:attrName>style.visibility</p:attrName>
+                                        </p:attrNameLst>
+                                      </p:cBhvr>
+                                      <p:to>
+                                        <p:strVal val="visible"/>
+                                      </p:to>
+                                    </p:set>
+                                  </p:childTnLst>
+                                </p:cTn>
+                              </p:par>
+                              <p:par>
+                                <p:cTn id="31" presetID="1" presetClass="entr" presetSubtype="0" fill="hold" grpId="0" nodeType="withEffect">
+                                  <p:stCondLst>
+                                    <p:cond delay="0"/>
+                                  </p:stCondLst>
+                                  <p:childTnLst>
+                                    <p:set>
+                                      <p:cBhvr>
+                                        <p:cTn id="32" dur="1" fill="hold">
+                                          <p:stCondLst>
+                                            <p:cond delay="0"/>
+                                          </p:stCondLst>
+                                        </p:cTn>
+                                        <p:tgtEl>
+                                          <p:spTgt spid="3">
+                                            <p:txEl>
+                                              <p:pRg st="8" end="8"/>
+                                            </p:txEl>
+                                          </p:spTgt>
+                                        </p:tgtEl>
+                                        <p:attrNameLst>
+                                          <p:attrName>style.visibility</p:attrName>
+                                        </p:attrNameLst>
+                                      </p:cBhvr>
+                                      <p:to>
+                                        <p:strVal val="visible"/>
+                                      </p:to>
+                                    </p:set>
+                                  </p:childTnLst>
+                                </p:cTn>
+                              </p:par>
+                            </p:childTnLst>
+                          </p:cTn>
+                        </p:par>
+                      </p:childTnLst>
+                    </p:cTn>
+                  </p:par>
+                  <p:par>
+                    <p:cTn id="33" fill="hold">
+                      <p:stCondLst>
+                        <p:cond delay="indefinite"/>
+                      </p:stCondLst>
+                      <p:childTnLst>
+                        <p:par>
+                          <p:cTn id="34" fill="hold">
+                            <p:stCondLst>
+                              <p:cond delay="0"/>
+                            </p:stCondLst>
+                            <p:childTnLst>
+                              <p:par>
+                                <p:cTn id="35" presetID="1" presetClass="entr" presetSubtype="0" fill="hold" grpId="0" nodeType="clickEffect">
+                                  <p:stCondLst>
+                                    <p:cond delay="0"/>
+                                  </p:stCondLst>
+                                  <p:childTnLst>
+                                    <p:set>
+                                      <p:cBhvr>
+                                        <p:cTn id="36" dur="1" fill="hold">
+                                          <p:stCondLst>
+                                            <p:cond delay="0"/>
+                                          </p:stCondLst>
+                                        </p:cTn>
+                                        <p:tgtEl>
+                                          <p:spTgt spid="3">
+                                            <p:txEl>
+                                              <p:pRg st="9" end="9"/>
+                                            </p:txEl>
+                                          </p:spTgt>
+                                        </p:tgtEl>
+                                        <p:attrNameLst>
+                                          <p:attrName>style.visibility</p:attrName>
+                                        </p:attrNameLst>
+                                      </p:cBhvr>
+                                      <p:to>
+                                        <p:strVal val="visible"/>
+                                      </p:to>
+                                    </p:set>
+                                  </p:childTnLst>
+                                </p:cTn>
+                              </p:par>
+                              <p:par>
+                                <p:cTn id="37" presetID="1" presetClass="entr" presetSubtype="0" fill="hold" grpId="0" nodeType="withEffect">
+                                  <p:stCondLst>
+                                    <p:cond delay="0"/>
+                                  </p:stCondLst>
+                                  <p:childTnLst>
+                                    <p:set>
+                                      <p:cBhvr>
+                                        <p:cTn id="38" dur="1" fill="hold">
+                                          <p:stCondLst>
+                                            <p:cond delay="0"/>
+                                          </p:stCondLst>
+                                        </p:cTn>
+                                        <p:tgtEl>
+                                          <p:spTgt spid="3">
+                                            <p:txEl>
+                                              <p:pRg st="10" end="10"/>
+                                            </p:txEl>
+                                          </p:spTgt>
+                                        </p:tgtEl>
+                                        <p:attrNameLst>
+                                          <p:attrName>style.visibility</p:attrName>
+                                        </p:attrNameLst>
+                                      </p:cBhvr>
+                                      <p:to>
+                                        <p:strVal val="visible"/>
+                                      </p:to>
+                                    </p:set>
+                                  </p:childTnLst>
+                                </p:cTn>
+                              </p:par>
+                            </p:childTnLst>
+                          </p:cTn>
+                        </p:par>
+                      </p:childTnLst>
+                    </p:cTn>
+                  </p:par>
+                  <p:par>
+                    <p:cTn id="39" fill="hold">
+                      <p:stCondLst>
+                        <p:cond delay="indefinite"/>
+                      </p:stCondLst>
+                      <p:childTnLst>
+                        <p:par>
+                          <p:cTn id="40" fill="hold">
+                            <p:stCondLst>
+                              <p:cond delay="0"/>
+                            </p:stCondLst>
+                            <p:childTnLst>
+                              <p:par>
+                                <p:cTn id="41" presetID="1" presetClass="entr" presetSubtype="0" fill="hold" grpId="0" nodeType="clickEffect">
+                                  <p:stCondLst>
+                                    <p:cond delay="0"/>
+                                  </p:stCondLst>
+                                  <p:childTnLst>
+                                    <p:set>
+                                      <p:cBhvr>
+                                        <p:cTn id="42" dur="1" fill="hold">
+                                          <p:stCondLst>
+                                            <p:cond delay="0"/>
+                                          </p:stCondLst>
+                                        </p:cTn>
+                                        <p:tgtEl>
+                                          <p:spTgt spid="3">
+                                            <p:txEl>
+                                              <p:pRg st="11" end="11"/>
+                                            </p:txEl>
+                                          </p:spTgt>
+                                        </p:tgtEl>
+                                        <p:attrNameLst>
+                                          <p:attrName>style.visibility</p:attrName>
+                                        </p:attrNameLst>
+                                      </p:cBhvr>
+                                      <p:to>
+                                        <p:strVal val="visible"/>
+                                      </p:to>
+                                    </p:set>
+                                  </p:childTnLst>
+                                </p:cTn>
+                              </p:par>
+                            </p:childTnLst>
+                          </p:cTn>
+                        </p:par>
+                      </p:childTnLst>
+                    </p:cTn>
+                  </p:par>
+                  <p:par>
+                    <p:cTn id="43" fill="hold">
+                      <p:stCondLst>
+                        <p:cond delay="indefinite"/>
+                      </p:stCondLst>
+                      <p:childTnLst>
+                        <p:par>
+                          <p:cTn id="44" fill="hold">
+                            <p:stCondLst>
+                              <p:cond delay="0"/>
+                            </p:stCondLst>
+                            <p:childTnLst>
+                              <p:par>
+                                <p:cTn id="45" presetID="1" presetClass="entr" presetSubtype="0" fill="hold" grpId="0" nodeType="clickEffect">
+                                  <p:stCondLst>
+                                    <p:cond delay="0"/>
+                                  </p:stCondLst>
+                                  <p:childTnLst>
+                                    <p:set>
+                                      <p:cBhvr>
+                                        <p:cTn id="46" dur="1" fill="hold">
+                                          <p:stCondLst>
+                                            <p:cond delay="0"/>
+                                          </p:stCondLst>
+                                        </p:cTn>
+                                        <p:tgtEl>
+                                          <p:spTgt spid="3">
+                                            <p:txEl>
+                                              <p:pRg st="12" end="12"/>
+                                            </p:txEl>
+                                          </p:spTgt>
+                                        </p:tgtEl>
+                                        <p:attrNameLst>
+                                          <p:attrName>style.visibility</p:attrName>
+                                        </p:attrNameLst>
+                                      </p:cBhvr>
+                                      <p:to>
+                                        <p:strVal val="visible"/>
+                                      </p:to>
+                                    </p:set>
+                                  </p:childTnLst>
+                                </p:cTn>
+                              </p:par>
+                            </p:childTnLst>
+                          </p:cTn>
+                        </p:par>
+                      </p:childTnLst>
+                    </p:cTn>
+                  </p:par>
+                </p:childTnLst>
+              </p:cTn>
+              <p:prevCondLst>
+                <p:cond evt="onPrev" delay="0">
+                  <p:tgtEl>
+                    <p:sldTgt/>
+                  </p:tgtEl>
+                </p:cond>
+              </p:prevCondLst>
+              <p:nextCondLst>
+                <p:cond evt="onNext" delay="0">
+                  <p:tgtEl>
+                    <p:sldTgt/>
+                  </p:tgtEl>
+                </p:cond>
+              </p:nextCondLst>
+            </p:seq>
+          </p:childTnLst>
+        </p:cTn>
+      </p:par>
+    </p:tnLst>
+    <p:bldLst>
+      <p:bldP spid="3" grpId="0" uiExpand="1" build="p" bldLvl="2"/>
+    </p:bldLst>
+  </p:timing>
 </p:sld>
 </file>
 
@@ -15813,7 +17789,7 @@
             <a:pPr lvl="1"/>
             <a:r>
               <a:rPr lang="en-US" dirty="0"/>
-              <a:t>Create a Kanban project board</a:t>
+              <a:t>Create a GitHub Kanban project board</a:t>
             </a:r>
           </a:p>
         </p:txBody>
@@ -15915,7 +17891,7 @@
             <a:pPr lvl="2"/>
             <a:r>
               <a:rPr lang="en-US" dirty="0"/>
-              <a:t>Create a Work Backlog based on these User Stories, expressed as GitHub issues</a:t>
+              <a:t>Create a Work Backlog based on the User Stories on the right, expressed as GitHub issues</a:t>
             </a:r>
           </a:p>
           <a:p>
@@ -16134,14 +18110,14 @@
           <a:p>
             <a:r>
               <a:rPr lang="en-US" dirty="0"/>
-              <a:t>If you’re trying something out for just this week, you probably don’t need project management</a:t>
+              <a:t>If you’re experimenting with something for just one week, you probably don’t need project management</a:t>
             </a:r>
           </a:p>
           <a:p>
             <a:pPr lvl="1"/>
             <a:r>
               <a:rPr lang="en-US" dirty="0"/>
-              <a:t>But are you sure it’s really just “this week”?</a:t>
+              <a:t>But are you sure it’s really just “one week”?</a:t>
             </a:r>
           </a:p>
         </p:txBody>
@@ -16156,6 +18132,279 @@
   <p:clrMapOvr>
     <a:masterClrMapping/>
   </p:clrMapOvr>
+  <p:timing>
+    <p:tnLst>
+      <p:par>
+        <p:cTn id="1" dur="indefinite" restart="never" nodeType="tmRoot">
+          <p:childTnLst>
+            <p:seq concurrent="1" nextAc="seek">
+              <p:cTn id="2" dur="indefinite" nodeType="mainSeq">
+                <p:childTnLst>
+                  <p:par>
+                    <p:cTn id="3" fill="hold">
+                      <p:stCondLst>
+                        <p:cond delay="indefinite"/>
+                      </p:stCondLst>
+                      <p:childTnLst>
+                        <p:par>
+                          <p:cTn id="4" fill="hold">
+                            <p:stCondLst>
+                              <p:cond delay="0"/>
+                            </p:stCondLst>
+                            <p:childTnLst>
+                              <p:par>
+                                <p:cTn id="5" presetID="1" presetClass="entr" presetSubtype="0" fill="hold" grpId="0" nodeType="clickEffect">
+                                  <p:stCondLst>
+                                    <p:cond delay="0"/>
+                                  </p:stCondLst>
+                                  <p:childTnLst>
+                                    <p:set>
+                                      <p:cBhvr>
+                                        <p:cTn id="6" dur="1" fill="hold">
+                                          <p:stCondLst>
+                                            <p:cond delay="0"/>
+                                          </p:stCondLst>
+                                        </p:cTn>
+                                        <p:tgtEl>
+                                          <p:spTgt spid="3">
+                                            <p:txEl>
+                                              <p:pRg st="0" end="0"/>
+                                            </p:txEl>
+                                          </p:spTgt>
+                                        </p:tgtEl>
+                                        <p:attrNameLst>
+                                          <p:attrName>style.visibility</p:attrName>
+                                        </p:attrNameLst>
+                                      </p:cBhvr>
+                                      <p:to>
+                                        <p:strVal val="visible"/>
+                                      </p:to>
+                                    </p:set>
+                                  </p:childTnLst>
+                                </p:cTn>
+                              </p:par>
+                              <p:par>
+                                <p:cTn id="7" presetID="1" presetClass="entr" presetSubtype="0" fill="hold" grpId="0" nodeType="withEffect">
+                                  <p:stCondLst>
+                                    <p:cond delay="0"/>
+                                  </p:stCondLst>
+                                  <p:childTnLst>
+                                    <p:set>
+                                      <p:cBhvr>
+                                        <p:cTn id="8" dur="1" fill="hold">
+                                          <p:stCondLst>
+                                            <p:cond delay="0"/>
+                                          </p:stCondLst>
+                                        </p:cTn>
+                                        <p:tgtEl>
+                                          <p:spTgt spid="3">
+                                            <p:txEl>
+                                              <p:pRg st="1" end="1"/>
+                                            </p:txEl>
+                                          </p:spTgt>
+                                        </p:tgtEl>
+                                        <p:attrNameLst>
+                                          <p:attrName>style.visibility</p:attrName>
+                                        </p:attrNameLst>
+                                      </p:cBhvr>
+                                      <p:to>
+                                        <p:strVal val="visible"/>
+                                      </p:to>
+                                    </p:set>
+                                  </p:childTnLst>
+                                </p:cTn>
+                              </p:par>
+                              <p:par>
+                                <p:cTn id="9" presetID="1" presetClass="entr" presetSubtype="0" fill="hold" grpId="0" nodeType="withEffect">
+                                  <p:stCondLst>
+                                    <p:cond delay="0"/>
+                                  </p:stCondLst>
+                                  <p:childTnLst>
+                                    <p:set>
+                                      <p:cBhvr>
+                                        <p:cTn id="10" dur="1" fill="hold">
+                                          <p:stCondLst>
+                                            <p:cond delay="0"/>
+                                          </p:stCondLst>
+                                        </p:cTn>
+                                        <p:tgtEl>
+                                          <p:spTgt spid="3">
+                                            <p:txEl>
+                                              <p:pRg st="2" end="2"/>
+                                            </p:txEl>
+                                          </p:spTgt>
+                                        </p:tgtEl>
+                                        <p:attrNameLst>
+                                          <p:attrName>style.visibility</p:attrName>
+                                        </p:attrNameLst>
+                                      </p:cBhvr>
+                                      <p:to>
+                                        <p:strVal val="visible"/>
+                                      </p:to>
+                                    </p:set>
+                                  </p:childTnLst>
+                                </p:cTn>
+                              </p:par>
+                            </p:childTnLst>
+                          </p:cTn>
+                        </p:par>
+                      </p:childTnLst>
+                    </p:cTn>
+                  </p:par>
+                  <p:par>
+                    <p:cTn id="11" fill="hold">
+                      <p:stCondLst>
+                        <p:cond delay="indefinite"/>
+                      </p:stCondLst>
+                      <p:childTnLst>
+                        <p:par>
+                          <p:cTn id="12" fill="hold">
+                            <p:stCondLst>
+                              <p:cond delay="0"/>
+                            </p:stCondLst>
+                            <p:childTnLst>
+                              <p:par>
+                                <p:cTn id="13" presetID="1" presetClass="entr" presetSubtype="0" fill="hold" grpId="0" nodeType="clickEffect">
+                                  <p:stCondLst>
+                                    <p:cond delay="0"/>
+                                  </p:stCondLst>
+                                  <p:childTnLst>
+                                    <p:set>
+                                      <p:cBhvr>
+                                        <p:cTn id="14" dur="1" fill="hold">
+                                          <p:stCondLst>
+                                            <p:cond delay="0"/>
+                                          </p:stCondLst>
+                                        </p:cTn>
+                                        <p:tgtEl>
+                                          <p:spTgt spid="3">
+                                            <p:txEl>
+                                              <p:pRg st="3" end="3"/>
+                                            </p:txEl>
+                                          </p:spTgt>
+                                        </p:tgtEl>
+                                        <p:attrNameLst>
+                                          <p:attrName>style.visibility</p:attrName>
+                                        </p:attrNameLst>
+                                      </p:cBhvr>
+                                      <p:to>
+                                        <p:strVal val="visible"/>
+                                      </p:to>
+                                    </p:set>
+                                  </p:childTnLst>
+                                </p:cTn>
+                              </p:par>
+                            </p:childTnLst>
+                          </p:cTn>
+                        </p:par>
+                      </p:childTnLst>
+                    </p:cTn>
+                  </p:par>
+                  <p:par>
+                    <p:cTn id="15" fill="hold">
+                      <p:stCondLst>
+                        <p:cond delay="indefinite"/>
+                      </p:stCondLst>
+                      <p:childTnLst>
+                        <p:par>
+                          <p:cTn id="16" fill="hold">
+                            <p:stCondLst>
+                              <p:cond delay="0"/>
+                            </p:stCondLst>
+                            <p:childTnLst>
+                              <p:par>
+                                <p:cTn id="17" presetID="1" presetClass="entr" presetSubtype="0" fill="hold" grpId="0" nodeType="clickEffect">
+                                  <p:stCondLst>
+                                    <p:cond delay="0"/>
+                                  </p:stCondLst>
+                                  <p:childTnLst>
+                                    <p:set>
+                                      <p:cBhvr>
+                                        <p:cTn id="18" dur="1" fill="hold">
+                                          <p:stCondLst>
+                                            <p:cond delay="0"/>
+                                          </p:stCondLst>
+                                        </p:cTn>
+                                        <p:tgtEl>
+                                          <p:spTgt spid="3">
+                                            <p:txEl>
+                                              <p:pRg st="4" end="4"/>
+                                            </p:txEl>
+                                          </p:spTgt>
+                                        </p:tgtEl>
+                                        <p:attrNameLst>
+                                          <p:attrName>style.visibility</p:attrName>
+                                        </p:attrNameLst>
+                                      </p:cBhvr>
+                                      <p:to>
+                                        <p:strVal val="visible"/>
+                                      </p:to>
+                                    </p:set>
+                                  </p:childTnLst>
+                                </p:cTn>
+                              </p:par>
+                              <p:par>
+                                <p:cTn id="19" presetID="1" presetClass="entr" presetSubtype="0" fill="hold" grpId="0" nodeType="withEffect">
+                                  <p:stCondLst>
+                                    <p:cond delay="0"/>
+                                  </p:stCondLst>
+                                  <p:childTnLst>
+                                    <p:set>
+                                      <p:cBhvr>
+                                        <p:cTn id="20" dur="1" fill="hold">
+                                          <p:stCondLst>
+                                            <p:cond delay="0"/>
+                                          </p:stCondLst>
+                                        </p:cTn>
+                                        <p:tgtEl>
+                                          <p:spTgt spid="3">
+                                            <p:txEl>
+                                              <p:pRg st="5" end="5"/>
+                                            </p:txEl>
+                                          </p:spTgt>
+                                        </p:tgtEl>
+                                        <p:attrNameLst>
+                                          <p:attrName>style.visibility</p:attrName>
+                                        </p:attrNameLst>
+                                      </p:cBhvr>
+                                      <p:to>
+                                        <p:strVal val="visible"/>
+                                      </p:to>
+                                    </p:set>
+                                  </p:childTnLst>
+                                </p:cTn>
+                              </p:par>
+                            </p:childTnLst>
+                          </p:cTn>
+                        </p:par>
+                      </p:childTnLst>
+                    </p:cTn>
+                  </p:par>
+                </p:childTnLst>
+              </p:cTn>
+              <p:prevCondLst>
+                <p:cond evt="onPrev" delay="0">
+                  <p:tgtEl>
+                    <p:sldTgt/>
+                  </p:tgtEl>
+                </p:cond>
+              </p:prevCondLst>
+              <p:nextCondLst>
+                <p:cond evt="onNext" delay="0">
+                  <p:tgtEl>
+                    <p:sldTgt/>
+                  </p:tgtEl>
+                </p:cond>
+              </p:nextCondLst>
+            </p:seq>
+          </p:childTnLst>
+        </p:cTn>
+      </p:par>
+    </p:tnLst>
+    <p:bldLst>
+      <p:bldP spid="3" grpId="0" uiExpand="1" build="p"/>
+    </p:bldLst>
+  </p:timing>
 </p:sld>
 </file>
 
@@ -16763,33 +19012,15 @@
                                   </p:childTnLst>
                                 </p:cTn>
                               </p:par>
-                            </p:childTnLst>
-                          </p:cTn>
-                        </p:par>
-                      </p:childTnLst>
-                    </p:cTn>
-                  </p:par>
-                  <p:par>
-                    <p:cTn id="25" fill="hold">
-                      <p:stCondLst>
-                        <p:cond delay="indefinite"/>
-                      </p:stCondLst>
-                      <p:childTnLst>
-                        <p:par>
-                          <p:cTn id="26" fill="hold">
-                            <p:stCondLst>
-                              <p:cond delay="0"/>
-                            </p:stCondLst>
-                            <p:childTnLst>
                               <p:par>
-                                <p:cTn id="27" presetID="1" presetClass="entr" presetSubtype="0" fill="hold" grpId="0" nodeType="clickEffect">
+                                <p:cTn id="25" presetID="1" presetClass="entr" presetSubtype="0" fill="hold" grpId="0" nodeType="withEffect">
                                   <p:stCondLst>
                                     <p:cond delay="0"/>
                                   </p:stCondLst>
                                   <p:childTnLst>
                                     <p:set>
                                       <p:cBhvr>
-                                        <p:cTn id="28" dur="1" fill="hold">
+                                        <p:cTn id="26" dur="1" fill="hold">
                                           <p:stCondLst>
                                             <p:cond delay="0"/>
                                           </p:stCondLst>
@@ -16812,33 +19043,15 @@
                                   </p:childTnLst>
                                 </p:cTn>
                               </p:par>
-                            </p:childTnLst>
-                          </p:cTn>
-                        </p:par>
-                      </p:childTnLst>
-                    </p:cTn>
-                  </p:par>
-                  <p:par>
-                    <p:cTn id="29" fill="hold">
-                      <p:stCondLst>
-                        <p:cond delay="indefinite"/>
-                      </p:stCondLst>
-                      <p:childTnLst>
-                        <p:par>
-                          <p:cTn id="30" fill="hold">
-                            <p:stCondLst>
-                              <p:cond delay="0"/>
-                            </p:stCondLst>
-                            <p:childTnLst>
                               <p:par>
-                                <p:cTn id="31" presetID="1" presetClass="entr" presetSubtype="0" fill="hold" grpId="0" nodeType="clickEffect">
+                                <p:cTn id="27" presetID="1" presetClass="entr" presetSubtype="0" fill="hold" grpId="0" nodeType="withEffect">
                                   <p:stCondLst>
                                     <p:cond delay="0"/>
                                   </p:stCondLst>
                                   <p:childTnLst>
                                     <p:set>
                                       <p:cBhvr>
-                                        <p:cTn id="32" dur="1" fill="hold">
+                                        <p:cTn id="28" dur="1" fill="hold">
                                           <p:stCondLst>
                                             <p:cond delay="0"/>
                                           </p:stCondLst>
@@ -16861,33 +19074,15 @@
                                   </p:childTnLst>
                                 </p:cTn>
                               </p:par>
-                            </p:childTnLst>
-                          </p:cTn>
-                        </p:par>
-                      </p:childTnLst>
-                    </p:cTn>
-                  </p:par>
-                  <p:par>
-                    <p:cTn id="33" fill="hold">
-                      <p:stCondLst>
-                        <p:cond delay="indefinite"/>
-                      </p:stCondLst>
-                      <p:childTnLst>
-                        <p:par>
-                          <p:cTn id="34" fill="hold">
-                            <p:stCondLst>
-                              <p:cond delay="0"/>
-                            </p:stCondLst>
-                            <p:childTnLst>
                               <p:par>
-                                <p:cTn id="35" presetID="1" presetClass="entr" presetSubtype="0" fill="hold" grpId="0" nodeType="clickEffect">
+                                <p:cTn id="29" presetID="1" presetClass="entr" presetSubtype="0" fill="hold" grpId="0" nodeType="withEffect">
                                   <p:stCondLst>
                                     <p:cond delay="0"/>
                                   </p:stCondLst>
                                   <p:childTnLst>
                                     <p:set>
                                       <p:cBhvr>
-                                        <p:cTn id="36" dur="1" fill="hold">
+                                        <p:cTn id="30" dur="1" fill="hold">
                                           <p:stCondLst>
                                             <p:cond delay="0"/>
                                           </p:stCondLst>
@@ -16917,26 +19112,26 @@
                     </p:cTn>
                   </p:par>
                   <p:par>
-                    <p:cTn id="37" fill="hold">
+                    <p:cTn id="31" fill="hold">
                       <p:stCondLst>
                         <p:cond delay="indefinite"/>
                       </p:stCondLst>
                       <p:childTnLst>
                         <p:par>
-                          <p:cTn id="38" fill="hold">
+                          <p:cTn id="32" fill="hold">
                             <p:stCondLst>
                               <p:cond delay="0"/>
                             </p:stCondLst>
                             <p:childTnLst>
                               <p:par>
-                                <p:cTn id="39" presetID="1" presetClass="entr" presetSubtype="0" fill="hold" grpId="0" nodeType="clickEffect">
+                                <p:cTn id="33" presetID="1" presetClass="entr" presetSubtype="0" fill="hold" grpId="0" nodeType="clickEffect">
                                   <p:stCondLst>
                                     <p:cond delay="0"/>
                                   </p:stCondLst>
                                   <p:childTnLst>
                                     <p:set>
                                       <p:cBhvr>
-                                        <p:cTn id="40" dur="1" fill="hold">
+                                        <p:cTn id="34" dur="1" fill="hold">
                                           <p:stCondLst>
                                             <p:cond delay="0"/>
                                           </p:stCondLst>
@@ -16959,33 +19154,15 @@
                                   </p:childTnLst>
                                 </p:cTn>
                               </p:par>
-                            </p:childTnLst>
-                          </p:cTn>
-                        </p:par>
-                      </p:childTnLst>
-                    </p:cTn>
-                  </p:par>
-                  <p:par>
-                    <p:cTn id="41" fill="hold">
-                      <p:stCondLst>
-                        <p:cond delay="indefinite"/>
-                      </p:stCondLst>
-                      <p:childTnLst>
-                        <p:par>
-                          <p:cTn id="42" fill="hold">
-                            <p:stCondLst>
-                              <p:cond delay="0"/>
-                            </p:stCondLst>
-                            <p:childTnLst>
                               <p:par>
-                                <p:cTn id="43" presetID="1" presetClass="entr" presetSubtype="0" fill="hold" grpId="0" nodeType="clickEffect">
+                                <p:cTn id="35" presetID="1" presetClass="entr" presetSubtype="0" fill="hold" grpId="0" nodeType="withEffect">
                                   <p:stCondLst>
                                     <p:cond delay="0"/>
                                   </p:stCondLst>
                                   <p:childTnLst>
                                     <p:set>
                                       <p:cBhvr>
-                                        <p:cTn id="44" dur="1" fill="hold">
+                                        <p:cTn id="36" dur="1" fill="hold">
                                           <p:stCondLst>
                                             <p:cond delay="0"/>
                                           </p:stCondLst>
@@ -17036,8 +19213,8 @@
       </p:par>
     </p:tnLst>
     <p:bldLst>
-      <p:bldP spid="3" grpId="0" uiExpand="1" build="p"/>
-      <p:bldP spid="5" grpId="0" build="p" bldLvl="2"/>
+      <p:bldP spid="3" grpId="0" build="p"/>
+      <p:bldP spid="5" grpId="0" uiExpand="1" build="p"/>
     </p:bldLst>
   </p:timing>
 </p:sld>
@@ -20819,7 +22996,7 @@
             </a:br>
             <a:r>
               <a:rPr lang="en-US" dirty="0"/>
-              <a:t>requirement right in the first place, than</a:t>
+              <a:t>requirement right in the first place than</a:t>
             </a:r>
             <a:br>
               <a:rPr lang="en-US" dirty="0"/>

</xml_diff>

<commit_message>
Add debrief slide, tweaks to animation, first commit of PDF
</commit_message>
<xml_diff>
--- a/presentations/ProjectManagement.pptx
+++ b/presentations/ProjectManagement.pptx
@@ -5,7 +5,7 @@
     <p:sldMasterId id="2147483648" r:id="rId1"/>
   </p:sldMasterIdLst>
   <p:notesMasterIdLst>
-    <p:notesMasterId r:id="rId29"/>
+    <p:notesMasterId r:id="rId30"/>
   </p:notesMasterIdLst>
   <p:sldIdLst>
     <p:sldId id="256" r:id="rId2"/>
@@ -35,6 +35,7 @@
     <p:sldId id="331" r:id="rId26"/>
     <p:sldId id="333" r:id="rId27"/>
     <p:sldId id="334" r:id="rId28"/>
+    <p:sldId id="335" r:id="rId29"/>
   </p:sldIdLst>
   <p:sldSz cx="12192000" cy="6858000"/>
   <p:notesSz cx="6858000" cy="9144000"/>
@@ -223,7 +224,7 @@
           <a:p>
             <a:fld id="{D2D8B8C6-4B17-274F-8E67-EB4AC742A4FC}" type="datetimeFigureOut">
               <a:rPr lang="en-US" smtClean="0"/>
-              <a:t>7/7/23</a:t>
+              <a:t>7/9/23</a:t>
             </a:fld>
             <a:endParaRPr lang="en-US"/>
           </a:p>
@@ -2202,6 +2203,90 @@
 </p:notes>
 </file>
 
+<file path=ppt/notesSlides/notesSlide28.xml><?xml version="1.0" encoding="utf-8"?>
+<p:notes xmlns:a="http://schemas.openxmlformats.org/drawingml/2006/main" xmlns:r="http://schemas.openxmlformats.org/officeDocument/2006/relationships" xmlns:p="http://schemas.openxmlformats.org/presentationml/2006/main">
+  <p:cSld>
+    <p:spTree>
+      <p:nvGrpSpPr>
+        <p:cNvPr id="1" name=""/>
+        <p:cNvGrpSpPr/>
+        <p:nvPr/>
+      </p:nvGrpSpPr>
+      <p:grpSpPr>
+        <a:xfrm>
+          <a:off x="0" y="0"/>
+          <a:ext cx="0" cy="0"/>
+          <a:chOff x="0" y="0"/>
+          <a:chExt cx="0" cy="0"/>
+        </a:xfrm>
+      </p:grpSpPr>
+      <p:sp>
+        <p:nvSpPr>
+          <p:cNvPr id="2" name="Slide Image Placeholder 1"/>
+          <p:cNvSpPr>
+            <a:spLocks noGrp="1" noRot="1" noChangeAspect="1"/>
+          </p:cNvSpPr>
+          <p:nvPr>
+            <p:ph type="sldImg"/>
+          </p:nvPr>
+        </p:nvSpPr>
+        <p:spPr/>
+      </p:sp>
+      <p:sp>
+        <p:nvSpPr>
+          <p:cNvPr id="3" name="Notes Placeholder 2"/>
+          <p:cNvSpPr>
+            <a:spLocks noGrp="1"/>
+          </p:cNvSpPr>
+          <p:nvPr>
+            <p:ph type="body" idx="1"/>
+          </p:nvPr>
+        </p:nvSpPr>
+        <p:spPr/>
+        <p:txBody>
+          <a:bodyPr/>
+          <a:lstStyle/>
+          <a:p>
+            <a:endParaRPr lang="en-US"/>
+          </a:p>
+        </p:txBody>
+      </p:sp>
+      <p:sp>
+        <p:nvSpPr>
+          <p:cNvPr id="4" name="Slide Number Placeholder 3"/>
+          <p:cNvSpPr>
+            <a:spLocks noGrp="1"/>
+          </p:cNvSpPr>
+          <p:nvPr>
+            <p:ph type="sldNum" sz="quarter" idx="5"/>
+          </p:nvPr>
+        </p:nvSpPr>
+        <p:spPr/>
+        <p:txBody>
+          <a:bodyPr/>
+          <a:lstStyle/>
+          <a:p>
+            <a:fld id="{E47609C6-5A39-3046-9159-8FAF419A9129}" type="slidenum">
+              <a:rPr lang="en-US" smtClean="0"/>
+              <a:t>28</a:t>
+            </a:fld>
+            <a:endParaRPr lang="en-US"/>
+          </a:p>
+        </p:txBody>
+      </p:sp>
+    </p:spTree>
+    <p:extLst>
+      <p:ext uri="{BB962C8B-B14F-4D97-AF65-F5344CB8AC3E}">
+        <p14:creationId xmlns:p14="http://schemas.microsoft.com/office/powerpoint/2010/main" val="1551150509"/>
+      </p:ext>
+    </p:extLst>
+  </p:cSld>
+  <p:clrMapOvr>
+    <a:masterClrMapping/>
+  </p:clrMapOvr>
+</p:notes>
+</file>
+
 <file path=ppt/notesSlides/notesSlide3.xml><?xml version="1.0" encoding="utf-8"?>
 <p:notes xmlns:a="http://schemas.openxmlformats.org/drawingml/2006/main" xmlns:r="http://schemas.openxmlformats.org/officeDocument/2006/relationships" xmlns:p="http://schemas.openxmlformats.org/presentationml/2006/main">
   <p:cSld>
@@ -2975,7 +3060,7 @@
           <a:p>
             <a:fld id="{BCC8DBC9-650C-584B-AEB7-2C3D32E66174}" type="datetimeFigureOut">
               <a:rPr lang="en-US" smtClean="0"/>
-              <a:t>7/7/23</a:t>
+              <a:t>7/9/23</a:t>
             </a:fld>
             <a:endParaRPr lang="en-US"/>
           </a:p>
@@ -3173,7 +3258,7 @@
           <a:p>
             <a:fld id="{BCC8DBC9-650C-584B-AEB7-2C3D32E66174}" type="datetimeFigureOut">
               <a:rPr lang="en-US" smtClean="0"/>
-              <a:t>7/7/23</a:t>
+              <a:t>7/9/23</a:t>
             </a:fld>
             <a:endParaRPr lang="en-US"/>
           </a:p>
@@ -3381,7 +3466,7 @@
           <a:p>
             <a:fld id="{BCC8DBC9-650C-584B-AEB7-2C3D32E66174}" type="datetimeFigureOut">
               <a:rPr lang="en-US" smtClean="0"/>
-              <a:t>7/7/23</a:t>
+              <a:t>7/9/23</a:t>
             </a:fld>
             <a:endParaRPr lang="en-US"/>
           </a:p>
@@ -3579,7 +3664,7 @@
           <a:p>
             <a:fld id="{BCC8DBC9-650C-584B-AEB7-2C3D32E66174}" type="datetimeFigureOut">
               <a:rPr lang="en-US" smtClean="0"/>
-              <a:t>7/7/23</a:t>
+              <a:t>7/9/23</a:t>
             </a:fld>
             <a:endParaRPr lang="en-US"/>
           </a:p>
@@ -3854,7 +3939,7 @@
           <a:p>
             <a:fld id="{BCC8DBC9-650C-584B-AEB7-2C3D32E66174}" type="datetimeFigureOut">
               <a:rPr lang="en-US" smtClean="0"/>
-              <a:t>7/7/23</a:t>
+              <a:t>7/9/23</a:t>
             </a:fld>
             <a:endParaRPr lang="en-US"/>
           </a:p>
@@ -4119,7 +4204,7 @@
           <a:p>
             <a:fld id="{BCC8DBC9-650C-584B-AEB7-2C3D32E66174}" type="datetimeFigureOut">
               <a:rPr lang="en-US" smtClean="0"/>
-              <a:t>7/7/23</a:t>
+              <a:t>7/9/23</a:t>
             </a:fld>
             <a:endParaRPr lang="en-US"/>
           </a:p>
@@ -4531,7 +4616,7 @@
           <a:p>
             <a:fld id="{BCC8DBC9-650C-584B-AEB7-2C3D32E66174}" type="datetimeFigureOut">
               <a:rPr lang="en-US" smtClean="0"/>
-              <a:t>7/7/23</a:t>
+              <a:t>7/9/23</a:t>
             </a:fld>
             <a:endParaRPr lang="en-US"/>
           </a:p>
@@ -4672,7 +4757,7 @@
           <a:p>
             <a:fld id="{BCC8DBC9-650C-584B-AEB7-2C3D32E66174}" type="datetimeFigureOut">
               <a:rPr lang="en-US" smtClean="0"/>
-              <a:t>7/7/23</a:t>
+              <a:t>7/9/23</a:t>
             </a:fld>
             <a:endParaRPr lang="en-US"/>
           </a:p>
@@ -4785,7 +4870,7 @@
           <a:p>
             <a:fld id="{BCC8DBC9-650C-584B-AEB7-2C3D32E66174}" type="datetimeFigureOut">
               <a:rPr lang="en-US" smtClean="0"/>
-              <a:t>7/7/23</a:t>
+              <a:t>7/9/23</a:t>
             </a:fld>
             <a:endParaRPr lang="en-US"/>
           </a:p>
@@ -5096,7 +5181,7 @@
           <a:p>
             <a:fld id="{BCC8DBC9-650C-584B-AEB7-2C3D32E66174}" type="datetimeFigureOut">
               <a:rPr lang="en-US" smtClean="0"/>
-              <a:t>7/7/23</a:t>
+              <a:t>7/9/23</a:t>
             </a:fld>
             <a:endParaRPr lang="en-US"/>
           </a:p>
@@ -5384,7 +5469,7 @@
           <a:p>
             <a:fld id="{BCC8DBC9-650C-584B-AEB7-2C3D32E66174}" type="datetimeFigureOut">
               <a:rPr lang="en-US" smtClean="0"/>
-              <a:t>7/7/23</a:t>
+              <a:t>7/9/23</a:t>
             </a:fld>
             <a:endParaRPr lang="en-US"/>
           </a:p>
@@ -5625,7 +5710,7 @@
           <a:p>
             <a:fld id="{BCC8DBC9-650C-584B-AEB7-2C3D32E66174}" type="datetimeFigureOut">
               <a:rPr lang="en-US" smtClean="0"/>
-              <a:t>7/7/23</a:t>
+              <a:t>7/9/23</a:t>
             </a:fld>
             <a:endParaRPr lang="en-US"/>
           </a:p>
@@ -17804,6 +17889,230 @@
   <p:clrMapOvr>
     <a:masterClrMapping/>
   </p:clrMapOvr>
+  <p:timing>
+    <p:tnLst>
+      <p:par>
+        <p:cTn id="1" dur="indefinite" restart="never" nodeType="tmRoot">
+          <p:childTnLst>
+            <p:seq concurrent="1" nextAc="seek">
+              <p:cTn id="2" dur="indefinite" nodeType="mainSeq">
+                <p:childTnLst>
+                  <p:par>
+                    <p:cTn id="3" fill="hold">
+                      <p:stCondLst>
+                        <p:cond delay="indefinite"/>
+                      </p:stCondLst>
+                      <p:childTnLst>
+                        <p:par>
+                          <p:cTn id="4" fill="hold">
+                            <p:stCondLst>
+                              <p:cond delay="0"/>
+                            </p:stCondLst>
+                            <p:childTnLst>
+                              <p:par>
+                                <p:cTn id="5" presetID="1" presetClass="entr" presetSubtype="0" fill="hold" grpId="0" nodeType="clickEffect">
+                                  <p:stCondLst>
+                                    <p:cond delay="0"/>
+                                  </p:stCondLst>
+                                  <p:childTnLst>
+                                    <p:set>
+                                      <p:cBhvr>
+                                        <p:cTn id="6" dur="1" fill="hold">
+                                          <p:stCondLst>
+                                            <p:cond delay="0"/>
+                                          </p:stCondLst>
+                                        </p:cTn>
+                                        <p:tgtEl>
+                                          <p:spTgt spid="3">
+                                            <p:txEl>
+                                              <p:pRg st="0" end="0"/>
+                                            </p:txEl>
+                                          </p:spTgt>
+                                        </p:tgtEl>
+                                        <p:attrNameLst>
+                                          <p:attrName>style.visibility</p:attrName>
+                                        </p:attrNameLst>
+                                      </p:cBhvr>
+                                      <p:to>
+                                        <p:strVal val="visible"/>
+                                      </p:to>
+                                    </p:set>
+                                  </p:childTnLst>
+                                </p:cTn>
+                              </p:par>
+                              <p:par>
+                                <p:cTn id="7" presetID="1" presetClass="entr" presetSubtype="0" fill="hold" grpId="0" nodeType="withEffect">
+                                  <p:stCondLst>
+                                    <p:cond delay="0"/>
+                                  </p:stCondLst>
+                                  <p:childTnLst>
+                                    <p:set>
+                                      <p:cBhvr>
+                                        <p:cTn id="8" dur="1" fill="hold">
+                                          <p:stCondLst>
+                                            <p:cond delay="0"/>
+                                          </p:stCondLst>
+                                        </p:cTn>
+                                        <p:tgtEl>
+                                          <p:spTgt spid="3">
+                                            <p:txEl>
+                                              <p:pRg st="1" end="1"/>
+                                            </p:txEl>
+                                          </p:spTgt>
+                                        </p:tgtEl>
+                                        <p:attrNameLst>
+                                          <p:attrName>style.visibility</p:attrName>
+                                        </p:attrNameLst>
+                                      </p:cBhvr>
+                                      <p:to>
+                                        <p:strVal val="visible"/>
+                                      </p:to>
+                                    </p:set>
+                                  </p:childTnLst>
+                                </p:cTn>
+                              </p:par>
+                              <p:par>
+                                <p:cTn id="9" presetID="1" presetClass="entr" presetSubtype="0" fill="hold" grpId="0" nodeType="withEffect">
+                                  <p:stCondLst>
+                                    <p:cond delay="0"/>
+                                  </p:stCondLst>
+                                  <p:childTnLst>
+                                    <p:set>
+                                      <p:cBhvr>
+                                        <p:cTn id="10" dur="1" fill="hold">
+                                          <p:stCondLst>
+                                            <p:cond delay="0"/>
+                                          </p:stCondLst>
+                                        </p:cTn>
+                                        <p:tgtEl>
+                                          <p:spTgt spid="3">
+                                            <p:txEl>
+                                              <p:pRg st="2" end="2"/>
+                                            </p:txEl>
+                                          </p:spTgt>
+                                        </p:tgtEl>
+                                        <p:attrNameLst>
+                                          <p:attrName>style.visibility</p:attrName>
+                                        </p:attrNameLst>
+                                      </p:cBhvr>
+                                      <p:to>
+                                        <p:strVal val="visible"/>
+                                      </p:to>
+                                    </p:set>
+                                  </p:childTnLst>
+                                </p:cTn>
+                              </p:par>
+                            </p:childTnLst>
+                          </p:cTn>
+                        </p:par>
+                      </p:childTnLst>
+                    </p:cTn>
+                  </p:par>
+                  <p:par>
+                    <p:cTn id="11" fill="hold">
+                      <p:stCondLst>
+                        <p:cond delay="indefinite"/>
+                      </p:stCondLst>
+                      <p:childTnLst>
+                        <p:par>
+                          <p:cTn id="12" fill="hold">
+                            <p:stCondLst>
+                              <p:cond delay="0"/>
+                            </p:stCondLst>
+                            <p:childTnLst>
+                              <p:par>
+                                <p:cTn id="13" presetID="1" presetClass="entr" presetSubtype="0" fill="hold" grpId="0" nodeType="clickEffect">
+                                  <p:stCondLst>
+                                    <p:cond delay="0"/>
+                                  </p:stCondLst>
+                                  <p:childTnLst>
+                                    <p:set>
+                                      <p:cBhvr>
+                                        <p:cTn id="14" dur="1" fill="hold">
+                                          <p:stCondLst>
+                                            <p:cond delay="0"/>
+                                          </p:stCondLst>
+                                        </p:cTn>
+                                        <p:tgtEl>
+                                          <p:spTgt spid="3">
+                                            <p:txEl>
+                                              <p:pRg st="3" end="3"/>
+                                            </p:txEl>
+                                          </p:spTgt>
+                                        </p:tgtEl>
+                                        <p:attrNameLst>
+                                          <p:attrName>style.visibility</p:attrName>
+                                        </p:attrNameLst>
+                                      </p:cBhvr>
+                                      <p:to>
+                                        <p:strVal val="visible"/>
+                                      </p:to>
+                                    </p:set>
+                                  </p:childTnLst>
+                                </p:cTn>
+                              </p:par>
+                              <p:par>
+                                <p:cTn id="15" presetID="1" presetClass="entr" presetSubtype="0" fill="hold" grpId="0" nodeType="withEffect">
+                                  <p:stCondLst>
+                                    <p:cond delay="0"/>
+                                  </p:stCondLst>
+                                  <p:childTnLst>
+                                    <p:set>
+                                      <p:cBhvr>
+                                        <p:cTn id="16" dur="1" fill="hold">
+                                          <p:stCondLst>
+                                            <p:cond delay="0"/>
+                                          </p:stCondLst>
+                                        </p:cTn>
+                                        <p:tgtEl>
+                                          <p:spTgt spid="3">
+                                            <p:txEl>
+                                              <p:pRg st="4" end="4"/>
+                                            </p:txEl>
+                                          </p:spTgt>
+                                        </p:tgtEl>
+                                        <p:attrNameLst>
+                                          <p:attrName>style.visibility</p:attrName>
+                                        </p:attrNameLst>
+                                      </p:cBhvr>
+                                      <p:to>
+                                        <p:strVal val="visible"/>
+                                      </p:to>
+                                    </p:set>
+                                  </p:childTnLst>
+                                </p:cTn>
+                              </p:par>
+                            </p:childTnLst>
+                          </p:cTn>
+                        </p:par>
+                      </p:childTnLst>
+                    </p:cTn>
+                  </p:par>
+                </p:childTnLst>
+              </p:cTn>
+              <p:prevCondLst>
+                <p:cond evt="onPrev" delay="0">
+                  <p:tgtEl>
+                    <p:sldTgt/>
+                  </p:tgtEl>
+                </p:cond>
+              </p:prevCondLst>
+              <p:nextCondLst>
+                <p:cond evt="onNext" delay="0">
+                  <p:tgtEl>
+                    <p:sldTgt/>
+                  </p:tgtEl>
+                </p:cond>
+              </p:nextCondLst>
+            </p:seq>
+          </p:childTnLst>
+        </p:cTn>
+      </p:par>
+    </p:tnLst>
+    <p:bldLst>
+      <p:bldP spid="3" grpId="0" build="p"/>
+    </p:bldLst>
+  </p:timing>
 </p:sld>
 </file>
 
@@ -17994,10 +18303,6 @@
               <a:t>As a user, I can display “before” and “after” images such that I can easily see differences</a:t>
             </a:r>
           </a:p>
-          <a:p>
-            <a:pPr lvl="1"/>
-            <a:endParaRPr lang="en-US" dirty="0"/>
-          </a:p>
         </p:txBody>
       </p:sp>
     </p:spTree>
@@ -18010,6 +18315,762 @@
   <p:clrMapOvr>
     <a:masterClrMapping/>
   </p:clrMapOvr>
+  <p:timing>
+    <p:tnLst>
+      <p:par>
+        <p:cTn id="1" dur="indefinite" restart="never" nodeType="tmRoot">
+          <p:childTnLst>
+            <p:seq concurrent="1" nextAc="seek">
+              <p:cTn id="2" dur="indefinite" nodeType="mainSeq">
+                <p:childTnLst>
+                  <p:par>
+                    <p:cTn id="3" fill="hold">
+                      <p:stCondLst>
+                        <p:cond delay="indefinite"/>
+                      </p:stCondLst>
+                      <p:childTnLst>
+                        <p:par>
+                          <p:cTn id="4" fill="hold">
+                            <p:stCondLst>
+                              <p:cond delay="0"/>
+                            </p:stCondLst>
+                            <p:childTnLst>
+                              <p:par>
+                                <p:cTn id="5" presetID="1" presetClass="entr" presetSubtype="0" fill="hold" grpId="0" nodeType="clickEffect">
+                                  <p:stCondLst>
+                                    <p:cond delay="0"/>
+                                  </p:stCondLst>
+                                  <p:childTnLst>
+                                    <p:set>
+                                      <p:cBhvr>
+                                        <p:cTn id="6" dur="1" fill="hold">
+                                          <p:stCondLst>
+                                            <p:cond delay="0"/>
+                                          </p:stCondLst>
+                                        </p:cTn>
+                                        <p:tgtEl>
+                                          <p:spTgt spid="3">
+                                            <p:txEl>
+                                              <p:pRg st="0" end="0"/>
+                                            </p:txEl>
+                                          </p:spTgt>
+                                        </p:tgtEl>
+                                        <p:attrNameLst>
+                                          <p:attrName>style.visibility</p:attrName>
+                                        </p:attrNameLst>
+                                      </p:cBhvr>
+                                      <p:to>
+                                        <p:strVal val="visible"/>
+                                      </p:to>
+                                    </p:set>
+                                  </p:childTnLst>
+                                </p:cTn>
+                              </p:par>
+                            </p:childTnLst>
+                          </p:cTn>
+                        </p:par>
+                      </p:childTnLst>
+                    </p:cTn>
+                  </p:par>
+                  <p:par>
+                    <p:cTn id="7" fill="hold">
+                      <p:stCondLst>
+                        <p:cond delay="indefinite"/>
+                      </p:stCondLst>
+                      <p:childTnLst>
+                        <p:par>
+                          <p:cTn id="8" fill="hold">
+                            <p:stCondLst>
+                              <p:cond delay="0"/>
+                            </p:stCondLst>
+                            <p:childTnLst>
+                              <p:par>
+                                <p:cTn id="9" presetID="1" presetClass="entr" presetSubtype="0" fill="hold" grpId="0" nodeType="clickEffect">
+                                  <p:stCondLst>
+                                    <p:cond delay="0"/>
+                                  </p:stCondLst>
+                                  <p:childTnLst>
+                                    <p:set>
+                                      <p:cBhvr>
+                                        <p:cTn id="10" dur="1" fill="hold">
+                                          <p:stCondLst>
+                                            <p:cond delay="0"/>
+                                          </p:stCondLst>
+                                        </p:cTn>
+                                        <p:tgtEl>
+                                          <p:spTgt spid="3">
+                                            <p:txEl>
+                                              <p:pRg st="1" end="1"/>
+                                            </p:txEl>
+                                          </p:spTgt>
+                                        </p:tgtEl>
+                                        <p:attrNameLst>
+                                          <p:attrName>style.visibility</p:attrName>
+                                        </p:attrNameLst>
+                                      </p:cBhvr>
+                                      <p:to>
+                                        <p:strVal val="visible"/>
+                                      </p:to>
+                                    </p:set>
+                                  </p:childTnLst>
+                                </p:cTn>
+                              </p:par>
+                              <p:par>
+                                <p:cTn id="11" presetID="1" presetClass="entr" presetSubtype="0" fill="hold" grpId="0" nodeType="withEffect">
+                                  <p:stCondLst>
+                                    <p:cond delay="0"/>
+                                  </p:stCondLst>
+                                  <p:childTnLst>
+                                    <p:set>
+                                      <p:cBhvr>
+                                        <p:cTn id="12" dur="1" fill="hold">
+                                          <p:stCondLst>
+                                            <p:cond delay="0"/>
+                                          </p:stCondLst>
+                                        </p:cTn>
+                                        <p:tgtEl>
+                                          <p:spTgt spid="3">
+                                            <p:txEl>
+                                              <p:pRg st="2" end="2"/>
+                                            </p:txEl>
+                                          </p:spTgt>
+                                        </p:tgtEl>
+                                        <p:attrNameLst>
+                                          <p:attrName>style.visibility</p:attrName>
+                                        </p:attrNameLst>
+                                      </p:cBhvr>
+                                      <p:to>
+                                        <p:strVal val="visible"/>
+                                      </p:to>
+                                    </p:set>
+                                  </p:childTnLst>
+                                </p:cTn>
+                              </p:par>
+                              <p:par>
+                                <p:cTn id="13" presetID="1" presetClass="entr" presetSubtype="0" fill="hold" grpId="0" nodeType="withEffect">
+                                  <p:stCondLst>
+                                    <p:cond delay="0"/>
+                                  </p:stCondLst>
+                                  <p:childTnLst>
+                                    <p:set>
+                                      <p:cBhvr>
+                                        <p:cTn id="14" dur="1" fill="hold">
+                                          <p:stCondLst>
+                                            <p:cond delay="0"/>
+                                          </p:stCondLst>
+                                        </p:cTn>
+                                        <p:tgtEl>
+                                          <p:spTgt spid="3">
+                                            <p:txEl>
+                                              <p:pRg st="3" end="3"/>
+                                            </p:txEl>
+                                          </p:spTgt>
+                                        </p:tgtEl>
+                                        <p:attrNameLst>
+                                          <p:attrName>style.visibility</p:attrName>
+                                        </p:attrNameLst>
+                                      </p:cBhvr>
+                                      <p:to>
+                                        <p:strVal val="visible"/>
+                                      </p:to>
+                                    </p:set>
+                                  </p:childTnLst>
+                                </p:cTn>
+                              </p:par>
+                            </p:childTnLst>
+                          </p:cTn>
+                        </p:par>
+                      </p:childTnLst>
+                    </p:cTn>
+                  </p:par>
+                  <p:par>
+                    <p:cTn id="15" fill="hold">
+                      <p:stCondLst>
+                        <p:cond delay="indefinite"/>
+                      </p:stCondLst>
+                      <p:childTnLst>
+                        <p:par>
+                          <p:cTn id="16" fill="hold">
+                            <p:stCondLst>
+                              <p:cond delay="0"/>
+                            </p:stCondLst>
+                            <p:childTnLst>
+                              <p:par>
+                                <p:cTn id="17" presetID="1" presetClass="entr" presetSubtype="0" fill="hold" grpId="0" nodeType="clickEffect">
+                                  <p:stCondLst>
+                                    <p:cond delay="0"/>
+                                  </p:stCondLst>
+                                  <p:childTnLst>
+                                    <p:set>
+                                      <p:cBhvr>
+                                        <p:cTn id="18" dur="1" fill="hold">
+                                          <p:stCondLst>
+                                            <p:cond delay="0"/>
+                                          </p:stCondLst>
+                                        </p:cTn>
+                                        <p:tgtEl>
+                                          <p:spTgt spid="3">
+                                            <p:txEl>
+                                              <p:pRg st="4" end="4"/>
+                                            </p:txEl>
+                                          </p:spTgt>
+                                        </p:tgtEl>
+                                        <p:attrNameLst>
+                                          <p:attrName>style.visibility</p:attrName>
+                                        </p:attrNameLst>
+                                      </p:cBhvr>
+                                      <p:to>
+                                        <p:strVal val="visible"/>
+                                      </p:to>
+                                    </p:set>
+                                  </p:childTnLst>
+                                </p:cTn>
+                              </p:par>
+                              <p:par>
+                                <p:cTn id="19" presetID="1" presetClass="entr" presetSubtype="0" fill="hold" grpId="0" nodeType="withEffect">
+                                  <p:stCondLst>
+                                    <p:cond delay="0"/>
+                                  </p:stCondLst>
+                                  <p:childTnLst>
+                                    <p:set>
+                                      <p:cBhvr>
+                                        <p:cTn id="20" dur="1" fill="hold">
+                                          <p:stCondLst>
+                                            <p:cond delay="0"/>
+                                          </p:stCondLst>
+                                        </p:cTn>
+                                        <p:tgtEl>
+                                          <p:spTgt spid="3">
+                                            <p:txEl>
+                                              <p:pRg st="5" end="5"/>
+                                            </p:txEl>
+                                          </p:spTgt>
+                                        </p:tgtEl>
+                                        <p:attrNameLst>
+                                          <p:attrName>style.visibility</p:attrName>
+                                        </p:attrNameLst>
+                                      </p:cBhvr>
+                                      <p:to>
+                                        <p:strVal val="visible"/>
+                                      </p:to>
+                                    </p:set>
+                                  </p:childTnLst>
+                                </p:cTn>
+                              </p:par>
+                              <p:par>
+                                <p:cTn id="21" presetID="1" presetClass="entr" presetSubtype="0" fill="hold" grpId="0" nodeType="withEffect">
+                                  <p:stCondLst>
+                                    <p:cond delay="0"/>
+                                  </p:stCondLst>
+                                  <p:childTnLst>
+                                    <p:set>
+                                      <p:cBhvr>
+                                        <p:cTn id="22" dur="1" fill="hold">
+                                          <p:stCondLst>
+                                            <p:cond delay="0"/>
+                                          </p:stCondLst>
+                                        </p:cTn>
+                                        <p:tgtEl>
+                                          <p:spTgt spid="3">
+                                            <p:txEl>
+                                              <p:pRg st="6" end="6"/>
+                                            </p:txEl>
+                                          </p:spTgt>
+                                        </p:tgtEl>
+                                        <p:attrNameLst>
+                                          <p:attrName>style.visibility</p:attrName>
+                                        </p:attrNameLst>
+                                      </p:cBhvr>
+                                      <p:to>
+                                        <p:strVal val="visible"/>
+                                      </p:to>
+                                    </p:set>
+                                  </p:childTnLst>
+                                </p:cTn>
+                              </p:par>
+                            </p:childTnLst>
+                          </p:cTn>
+                        </p:par>
+                      </p:childTnLst>
+                    </p:cTn>
+                  </p:par>
+                  <p:par>
+                    <p:cTn id="23" fill="hold">
+                      <p:stCondLst>
+                        <p:cond delay="indefinite"/>
+                      </p:stCondLst>
+                      <p:childTnLst>
+                        <p:par>
+                          <p:cTn id="24" fill="hold">
+                            <p:stCondLst>
+                              <p:cond delay="0"/>
+                            </p:stCondLst>
+                            <p:childTnLst>
+                              <p:par>
+                                <p:cTn id="25" presetID="1" presetClass="entr" presetSubtype="0" fill="hold" grpId="0" nodeType="clickEffect">
+                                  <p:stCondLst>
+                                    <p:cond delay="0"/>
+                                  </p:stCondLst>
+                                  <p:childTnLst>
+                                    <p:set>
+                                      <p:cBhvr>
+                                        <p:cTn id="26" dur="1" fill="hold">
+                                          <p:stCondLst>
+                                            <p:cond delay="0"/>
+                                          </p:stCondLst>
+                                        </p:cTn>
+                                        <p:tgtEl>
+                                          <p:spTgt spid="4">
+                                            <p:txEl>
+                                              <p:pRg st="0" end="0"/>
+                                            </p:txEl>
+                                          </p:spTgt>
+                                        </p:tgtEl>
+                                        <p:attrNameLst>
+                                          <p:attrName>style.visibility</p:attrName>
+                                        </p:attrNameLst>
+                                      </p:cBhvr>
+                                      <p:to>
+                                        <p:strVal val="visible"/>
+                                      </p:to>
+                                    </p:set>
+                                  </p:childTnLst>
+                                </p:cTn>
+                              </p:par>
+                              <p:par>
+                                <p:cTn id="27" presetID="1" presetClass="entr" presetSubtype="0" fill="hold" grpId="0" nodeType="withEffect">
+                                  <p:stCondLst>
+                                    <p:cond delay="0"/>
+                                  </p:stCondLst>
+                                  <p:childTnLst>
+                                    <p:set>
+                                      <p:cBhvr>
+                                        <p:cTn id="28" dur="1" fill="hold">
+                                          <p:stCondLst>
+                                            <p:cond delay="0"/>
+                                          </p:stCondLst>
+                                        </p:cTn>
+                                        <p:tgtEl>
+                                          <p:spTgt spid="4">
+                                            <p:txEl>
+                                              <p:pRg st="1" end="1"/>
+                                            </p:txEl>
+                                          </p:spTgt>
+                                        </p:tgtEl>
+                                        <p:attrNameLst>
+                                          <p:attrName>style.visibility</p:attrName>
+                                        </p:attrNameLst>
+                                      </p:cBhvr>
+                                      <p:to>
+                                        <p:strVal val="visible"/>
+                                      </p:to>
+                                    </p:set>
+                                  </p:childTnLst>
+                                </p:cTn>
+                              </p:par>
+                              <p:par>
+                                <p:cTn id="29" presetID="1" presetClass="entr" presetSubtype="0" fill="hold" grpId="0" nodeType="withEffect">
+                                  <p:stCondLst>
+                                    <p:cond delay="0"/>
+                                  </p:stCondLst>
+                                  <p:childTnLst>
+                                    <p:set>
+                                      <p:cBhvr>
+                                        <p:cTn id="30" dur="1" fill="hold">
+                                          <p:stCondLst>
+                                            <p:cond delay="0"/>
+                                          </p:stCondLst>
+                                        </p:cTn>
+                                        <p:tgtEl>
+                                          <p:spTgt spid="4">
+                                            <p:txEl>
+                                              <p:pRg st="2" end="2"/>
+                                            </p:txEl>
+                                          </p:spTgt>
+                                        </p:tgtEl>
+                                        <p:attrNameLst>
+                                          <p:attrName>style.visibility</p:attrName>
+                                        </p:attrNameLst>
+                                      </p:cBhvr>
+                                      <p:to>
+                                        <p:strVal val="visible"/>
+                                      </p:to>
+                                    </p:set>
+                                  </p:childTnLst>
+                                </p:cTn>
+                              </p:par>
+                              <p:par>
+                                <p:cTn id="31" presetID="1" presetClass="entr" presetSubtype="0" fill="hold" grpId="0" nodeType="withEffect">
+                                  <p:stCondLst>
+                                    <p:cond delay="0"/>
+                                  </p:stCondLst>
+                                  <p:childTnLst>
+                                    <p:set>
+                                      <p:cBhvr>
+                                        <p:cTn id="32" dur="1" fill="hold">
+                                          <p:stCondLst>
+                                            <p:cond delay="0"/>
+                                          </p:stCondLst>
+                                        </p:cTn>
+                                        <p:tgtEl>
+                                          <p:spTgt spid="4">
+                                            <p:txEl>
+                                              <p:pRg st="3" end="3"/>
+                                            </p:txEl>
+                                          </p:spTgt>
+                                        </p:tgtEl>
+                                        <p:attrNameLst>
+                                          <p:attrName>style.visibility</p:attrName>
+                                        </p:attrNameLst>
+                                      </p:cBhvr>
+                                      <p:to>
+                                        <p:strVal val="visible"/>
+                                      </p:to>
+                                    </p:set>
+                                  </p:childTnLst>
+                                </p:cTn>
+                              </p:par>
+                              <p:par>
+                                <p:cTn id="33" presetID="1" presetClass="entr" presetSubtype="0" fill="hold" grpId="0" nodeType="withEffect">
+                                  <p:stCondLst>
+                                    <p:cond delay="0"/>
+                                  </p:stCondLst>
+                                  <p:childTnLst>
+                                    <p:set>
+                                      <p:cBhvr>
+                                        <p:cTn id="34" dur="1" fill="hold">
+                                          <p:stCondLst>
+                                            <p:cond delay="0"/>
+                                          </p:stCondLst>
+                                        </p:cTn>
+                                        <p:tgtEl>
+                                          <p:spTgt spid="4">
+                                            <p:txEl>
+                                              <p:pRg st="4" end="4"/>
+                                            </p:txEl>
+                                          </p:spTgt>
+                                        </p:tgtEl>
+                                        <p:attrNameLst>
+                                          <p:attrName>style.visibility</p:attrName>
+                                        </p:attrNameLst>
+                                      </p:cBhvr>
+                                      <p:to>
+                                        <p:strVal val="visible"/>
+                                      </p:to>
+                                    </p:set>
+                                  </p:childTnLst>
+                                </p:cTn>
+                              </p:par>
+                            </p:childTnLst>
+                          </p:cTn>
+                        </p:par>
+                      </p:childTnLst>
+                    </p:cTn>
+                  </p:par>
+                </p:childTnLst>
+              </p:cTn>
+              <p:prevCondLst>
+                <p:cond evt="onPrev" delay="0">
+                  <p:tgtEl>
+                    <p:sldTgt/>
+                  </p:tgtEl>
+                </p:cond>
+              </p:prevCondLst>
+              <p:nextCondLst>
+                <p:cond evt="onNext" delay="0">
+                  <p:tgtEl>
+                    <p:sldTgt/>
+                  </p:tgtEl>
+                </p:cond>
+              </p:nextCondLst>
+            </p:seq>
+          </p:childTnLst>
+        </p:cTn>
+      </p:par>
+    </p:tnLst>
+    <p:bldLst>
+      <p:bldP spid="3" grpId="0" build="p" bldLvl="2"/>
+      <p:bldP spid="4" grpId="0" build="p"/>
+    </p:bldLst>
+  </p:timing>
+</p:sld>
+</file>
+
+<file path=ppt/slides/slide28.xml><?xml version="1.0" encoding="utf-8"?>
+<p:sld xmlns:a="http://schemas.openxmlformats.org/drawingml/2006/main" xmlns:r="http://schemas.openxmlformats.org/officeDocument/2006/relationships" xmlns:p="http://schemas.openxmlformats.org/presentationml/2006/main">
+  <p:cSld>
+    <p:spTree>
+      <p:nvGrpSpPr>
+        <p:cNvPr id="1" name=""/>
+        <p:cNvGrpSpPr/>
+        <p:nvPr/>
+      </p:nvGrpSpPr>
+      <p:grpSpPr>
+        <a:xfrm>
+          <a:off x="0" y="0"/>
+          <a:ext cx="0" cy="0"/>
+          <a:chOff x="0" y="0"/>
+          <a:chExt cx="0" cy="0"/>
+        </a:xfrm>
+      </p:grpSpPr>
+      <p:sp>
+        <p:nvSpPr>
+          <p:cNvPr id="2" name="Title 1">
+            <a:extLst>
+              <a:ext uri="{FF2B5EF4-FFF2-40B4-BE49-F238E27FC236}">
+                <a16:creationId xmlns:a16="http://schemas.microsoft.com/office/drawing/2014/main" id="{B8E470AA-EB97-DE44-E848-A935F6A4B2AC}"/>
+              </a:ext>
+            </a:extLst>
+          </p:cNvPr>
+          <p:cNvSpPr>
+            <a:spLocks noGrp="1"/>
+          </p:cNvSpPr>
+          <p:nvPr>
+            <p:ph type="title"/>
+          </p:nvPr>
+        </p:nvSpPr>
+        <p:spPr/>
+        <p:txBody>
+          <a:bodyPr/>
+          <a:lstStyle/>
+          <a:p>
+            <a:r>
+              <a:rPr lang="en-US" dirty="0"/>
+              <a:t>Debrief</a:t>
+            </a:r>
+          </a:p>
+        </p:txBody>
+      </p:sp>
+      <p:sp>
+        <p:nvSpPr>
+          <p:cNvPr id="5" name="Content Placeholder 4">
+            <a:extLst>
+              <a:ext uri="{FF2B5EF4-FFF2-40B4-BE49-F238E27FC236}">
+                <a16:creationId xmlns:a16="http://schemas.microsoft.com/office/drawing/2014/main" id="{BC28C403-9BD8-DA20-297E-BBA1071897E7}"/>
+              </a:ext>
+            </a:extLst>
+          </p:cNvPr>
+          <p:cNvSpPr>
+            <a:spLocks noGrp="1"/>
+          </p:cNvSpPr>
+          <p:nvPr>
+            <p:ph idx="1"/>
+          </p:nvPr>
+        </p:nvSpPr>
+        <p:spPr/>
+        <p:txBody>
+          <a:bodyPr/>
+          <a:lstStyle/>
+          <a:p>
+            <a:r>
+              <a:rPr lang="en-US" dirty="0"/>
+              <a:t>Did you  encounter any problems during the activities?</a:t>
+            </a:r>
+          </a:p>
+          <a:p>
+            <a:r>
+              <a:rPr lang="en-US" dirty="0"/>
+              <a:t>Do you think you could use these techniques in your own projects?</a:t>
+            </a:r>
+          </a:p>
+          <a:p>
+            <a:r>
+              <a:rPr lang="en-US" dirty="0"/>
+              <a:t>Are there any areas where you would modify or customize the recommendations for your context?</a:t>
+            </a:r>
+          </a:p>
+        </p:txBody>
+      </p:sp>
+    </p:spTree>
+    <p:extLst>
+      <p:ext uri="{BB962C8B-B14F-4D97-AF65-F5344CB8AC3E}">
+        <p14:creationId xmlns:p14="http://schemas.microsoft.com/office/powerpoint/2010/main" val="226990516"/>
+      </p:ext>
+    </p:extLst>
+  </p:cSld>
+  <p:clrMapOvr>
+    <a:masterClrMapping/>
+  </p:clrMapOvr>
+  <p:timing>
+    <p:tnLst>
+      <p:par>
+        <p:cTn id="1" dur="indefinite" restart="never" nodeType="tmRoot">
+          <p:childTnLst>
+            <p:seq concurrent="1" nextAc="seek">
+              <p:cTn id="2" dur="indefinite" nodeType="mainSeq">
+                <p:childTnLst>
+                  <p:par>
+                    <p:cTn id="3" fill="hold">
+                      <p:stCondLst>
+                        <p:cond delay="indefinite"/>
+                      </p:stCondLst>
+                      <p:childTnLst>
+                        <p:par>
+                          <p:cTn id="4" fill="hold">
+                            <p:stCondLst>
+                              <p:cond delay="0"/>
+                            </p:stCondLst>
+                            <p:childTnLst>
+                              <p:par>
+                                <p:cTn id="5" presetID="1" presetClass="entr" presetSubtype="0" fill="hold" grpId="0" nodeType="clickEffect">
+                                  <p:stCondLst>
+                                    <p:cond delay="0"/>
+                                  </p:stCondLst>
+                                  <p:childTnLst>
+                                    <p:set>
+                                      <p:cBhvr>
+                                        <p:cTn id="6" dur="1" fill="hold">
+                                          <p:stCondLst>
+                                            <p:cond delay="0"/>
+                                          </p:stCondLst>
+                                        </p:cTn>
+                                        <p:tgtEl>
+                                          <p:spTgt spid="5">
+                                            <p:txEl>
+                                              <p:pRg st="0" end="0"/>
+                                            </p:txEl>
+                                          </p:spTgt>
+                                        </p:tgtEl>
+                                        <p:attrNameLst>
+                                          <p:attrName>style.visibility</p:attrName>
+                                        </p:attrNameLst>
+                                      </p:cBhvr>
+                                      <p:to>
+                                        <p:strVal val="visible"/>
+                                      </p:to>
+                                    </p:set>
+                                  </p:childTnLst>
+                                </p:cTn>
+                              </p:par>
+                            </p:childTnLst>
+                          </p:cTn>
+                        </p:par>
+                      </p:childTnLst>
+                    </p:cTn>
+                  </p:par>
+                  <p:par>
+                    <p:cTn id="7" fill="hold">
+                      <p:stCondLst>
+                        <p:cond delay="indefinite"/>
+                      </p:stCondLst>
+                      <p:childTnLst>
+                        <p:par>
+                          <p:cTn id="8" fill="hold">
+                            <p:stCondLst>
+                              <p:cond delay="0"/>
+                            </p:stCondLst>
+                            <p:childTnLst>
+                              <p:par>
+                                <p:cTn id="9" presetID="1" presetClass="entr" presetSubtype="0" fill="hold" grpId="0" nodeType="clickEffect">
+                                  <p:stCondLst>
+                                    <p:cond delay="0"/>
+                                  </p:stCondLst>
+                                  <p:childTnLst>
+                                    <p:set>
+                                      <p:cBhvr>
+                                        <p:cTn id="10" dur="1" fill="hold">
+                                          <p:stCondLst>
+                                            <p:cond delay="0"/>
+                                          </p:stCondLst>
+                                        </p:cTn>
+                                        <p:tgtEl>
+                                          <p:spTgt spid="5">
+                                            <p:txEl>
+                                              <p:pRg st="1" end="1"/>
+                                            </p:txEl>
+                                          </p:spTgt>
+                                        </p:tgtEl>
+                                        <p:attrNameLst>
+                                          <p:attrName>style.visibility</p:attrName>
+                                        </p:attrNameLst>
+                                      </p:cBhvr>
+                                      <p:to>
+                                        <p:strVal val="visible"/>
+                                      </p:to>
+                                    </p:set>
+                                  </p:childTnLst>
+                                </p:cTn>
+                              </p:par>
+                            </p:childTnLst>
+                          </p:cTn>
+                        </p:par>
+                      </p:childTnLst>
+                    </p:cTn>
+                  </p:par>
+                  <p:par>
+                    <p:cTn id="11" fill="hold">
+                      <p:stCondLst>
+                        <p:cond delay="indefinite"/>
+                      </p:stCondLst>
+                      <p:childTnLst>
+                        <p:par>
+                          <p:cTn id="12" fill="hold">
+                            <p:stCondLst>
+                              <p:cond delay="0"/>
+                            </p:stCondLst>
+                            <p:childTnLst>
+                              <p:par>
+                                <p:cTn id="13" presetID="1" presetClass="entr" presetSubtype="0" fill="hold" grpId="0" nodeType="clickEffect">
+                                  <p:stCondLst>
+                                    <p:cond delay="0"/>
+                                  </p:stCondLst>
+                                  <p:childTnLst>
+                                    <p:set>
+                                      <p:cBhvr>
+                                        <p:cTn id="14" dur="1" fill="hold">
+                                          <p:stCondLst>
+                                            <p:cond delay="0"/>
+                                          </p:stCondLst>
+                                        </p:cTn>
+                                        <p:tgtEl>
+                                          <p:spTgt spid="5">
+                                            <p:txEl>
+                                              <p:pRg st="2" end="2"/>
+                                            </p:txEl>
+                                          </p:spTgt>
+                                        </p:tgtEl>
+                                        <p:attrNameLst>
+                                          <p:attrName>style.visibility</p:attrName>
+                                        </p:attrNameLst>
+                                      </p:cBhvr>
+                                      <p:to>
+                                        <p:strVal val="visible"/>
+                                      </p:to>
+                                    </p:set>
+                                  </p:childTnLst>
+                                </p:cTn>
+                              </p:par>
+                            </p:childTnLst>
+                          </p:cTn>
+                        </p:par>
+                      </p:childTnLst>
+                    </p:cTn>
+                  </p:par>
+                </p:childTnLst>
+              </p:cTn>
+              <p:prevCondLst>
+                <p:cond evt="onPrev" delay="0">
+                  <p:tgtEl>
+                    <p:sldTgt/>
+                  </p:tgtEl>
+                </p:cond>
+              </p:prevCondLst>
+              <p:nextCondLst>
+                <p:cond evt="onNext" delay="0">
+                  <p:tgtEl>
+                    <p:sldTgt/>
+                  </p:tgtEl>
+                </p:cond>
+              </p:nextCondLst>
+            </p:seq>
+          </p:childTnLst>
+        </p:cTn>
+      </p:par>
+    </p:tnLst>
+    <p:bldLst>
+      <p:bldP spid="5" grpId="0" build="p"/>
+    </p:bldLst>
+  </p:timing>
 </p:sld>
 </file>
 
@@ -18746,15 +19807,33 @@
                                   </p:childTnLst>
                                 </p:cTn>
                               </p:par>
+                            </p:childTnLst>
+                          </p:cTn>
+                        </p:par>
+                      </p:childTnLst>
+                    </p:cTn>
+                  </p:par>
+                  <p:par>
+                    <p:cTn id="7" fill="hold">
+                      <p:stCondLst>
+                        <p:cond delay="indefinite"/>
+                      </p:stCondLst>
+                      <p:childTnLst>
+                        <p:par>
+                          <p:cTn id="8" fill="hold">
+                            <p:stCondLst>
+                              <p:cond delay="0"/>
+                            </p:stCondLst>
+                            <p:childTnLst>
                               <p:par>
-                                <p:cTn id="7" presetID="1" presetClass="entr" presetSubtype="0" fill="hold" grpId="0" nodeType="withEffect">
+                                <p:cTn id="9" presetID="1" presetClass="entr" presetSubtype="0" fill="hold" grpId="0" nodeType="clickEffect">
                                   <p:stCondLst>
                                     <p:cond delay="0"/>
                                   </p:stCondLst>
                                   <p:childTnLst>
                                     <p:set>
                                       <p:cBhvr>
-                                        <p:cTn id="8" dur="1" fill="hold">
+                                        <p:cTn id="10" dur="1" fill="hold">
                                           <p:stCondLst>
                                             <p:cond delay="0"/>
                                           </p:stCondLst>
@@ -18777,15 +19856,33 @@
                                   </p:childTnLst>
                                 </p:cTn>
                               </p:par>
+                            </p:childTnLst>
+                          </p:cTn>
+                        </p:par>
+                      </p:childTnLst>
+                    </p:cTn>
+                  </p:par>
+                  <p:par>
+                    <p:cTn id="11" fill="hold">
+                      <p:stCondLst>
+                        <p:cond delay="indefinite"/>
+                      </p:stCondLst>
+                      <p:childTnLst>
+                        <p:par>
+                          <p:cTn id="12" fill="hold">
+                            <p:stCondLst>
+                              <p:cond delay="0"/>
+                            </p:stCondLst>
+                            <p:childTnLst>
                               <p:par>
-                                <p:cTn id="9" presetID="1" presetClass="entr" presetSubtype="0" fill="hold" grpId="0" nodeType="withEffect">
+                                <p:cTn id="13" presetID="1" presetClass="entr" presetSubtype="0" fill="hold" grpId="0" nodeType="clickEffect">
                                   <p:stCondLst>
                                     <p:cond delay="0"/>
                                   </p:stCondLst>
                                   <p:childTnLst>
                                     <p:set>
                                       <p:cBhvr>
-                                        <p:cTn id="10" dur="1" fill="hold">
+                                        <p:cTn id="14" dur="1" fill="hold">
                                           <p:stCondLst>
                                             <p:cond delay="0"/>
                                           </p:stCondLst>
@@ -18808,15 +19905,33 @@
                                   </p:childTnLst>
                                 </p:cTn>
                               </p:par>
+                            </p:childTnLst>
+                          </p:cTn>
+                        </p:par>
+                      </p:childTnLst>
+                    </p:cTn>
+                  </p:par>
+                  <p:par>
+                    <p:cTn id="15" fill="hold">
+                      <p:stCondLst>
+                        <p:cond delay="indefinite"/>
+                      </p:stCondLst>
+                      <p:childTnLst>
+                        <p:par>
+                          <p:cTn id="16" fill="hold">
+                            <p:stCondLst>
+                              <p:cond delay="0"/>
+                            </p:stCondLst>
+                            <p:childTnLst>
                               <p:par>
-                                <p:cTn id="11" presetID="1" presetClass="entr" presetSubtype="0" fill="hold" grpId="0" nodeType="withEffect">
+                                <p:cTn id="17" presetID="1" presetClass="entr" presetSubtype="0" fill="hold" grpId="0" nodeType="clickEffect">
                                   <p:stCondLst>
                                     <p:cond delay="0"/>
                                   </p:stCondLst>
                                   <p:childTnLst>
                                     <p:set>
                                       <p:cBhvr>
-                                        <p:cTn id="12" dur="1" fill="hold">
+                                        <p:cTn id="18" dur="1" fill="hold">
                                           <p:stCondLst>
                                             <p:cond delay="0"/>
                                           </p:stCondLst>
@@ -18839,15 +19954,33 @@
                                   </p:childTnLst>
                                 </p:cTn>
                               </p:par>
+                            </p:childTnLst>
+                          </p:cTn>
+                        </p:par>
+                      </p:childTnLst>
+                    </p:cTn>
+                  </p:par>
+                  <p:par>
+                    <p:cTn id="19" fill="hold">
+                      <p:stCondLst>
+                        <p:cond delay="indefinite"/>
+                      </p:stCondLst>
+                      <p:childTnLst>
+                        <p:par>
+                          <p:cTn id="20" fill="hold">
+                            <p:stCondLst>
+                              <p:cond delay="0"/>
+                            </p:stCondLst>
+                            <p:childTnLst>
                               <p:par>
-                                <p:cTn id="13" presetID="1" presetClass="entr" presetSubtype="0" fill="hold" grpId="0" nodeType="withEffect">
+                                <p:cTn id="21" presetID="1" presetClass="entr" presetSubtype="0" fill="hold" grpId="0" nodeType="clickEffect">
                                   <p:stCondLst>
                                     <p:cond delay="0"/>
                                   </p:stCondLst>
                                   <p:childTnLst>
                                     <p:set>
                                       <p:cBhvr>
-                                        <p:cTn id="14" dur="1" fill="hold">
+                                        <p:cTn id="22" dur="1" fill="hold">
                                           <p:stCondLst>
                                             <p:cond delay="0"/>
                                           </p:stCondLst>
@@ -18870,15 +20003,33 @@
                                   </p:childTnLst>
                                 </p:cTn>
                               </p:par>
+                            </p:childTnLst>
+                          </p:cTn>
+                        </p:par>
+                      </p:childTnLst>
+                    </p:cTn>
+                  </p:par>
+                  <p:par>
+                    <p:cTn id="23" fill="hold">
+                      <p:stCondLst>
+                        <p:cond delay="indefinite"/>
+                      </p:stCondLst>
+                      <p:childTnLst>
+                        <p:par>
+                          <p:cTn id="24" fill="hold">
+                            <p:stCondLst>
+                              <p:cond delay="0"/>
+                            </p:stCondLst>
+                            <p:childTnLst>
                               <p:par>
-                                <p:cTn id="15" presetID="1" presetClass="entr" presetSubtype="0" fill="hold" grpId="0" nodeType="withEffect">
+                                <p:cTn id="25" presetID="1" presetClass="entr" presetSubtype="0" fill="hold" grpId="0" nodeType="clickEffect">
                                   <p:stCondLst>
                                     <p:cond delay="0"/>
                                   </p:stCondLst>
                                   <p:childTnLst>
                                     <p:set>
                                       <p:cBhvr>
-                                        <p:cTn id="16" dur="1" fill="hold">
+                                        <p:cTn id="26" dur="1" fill="hold">
                                           <p:stCondLst>
                                             <p:cond delay="0"/>
                                           </p:stCondLst>
@@ -18901,68 +20052,6 @@
                                   </p:childTnLst>
                                 </p:cTn>
                               </p:par>
-                              <p:par>
-                                <p:cTn id="17" presetID="1" presetClass="entr" presetSubtype="0" fill="hold" grpId="0" nodeType="withEffect">
-                                  <p:stCondLst>
-                                    <p:cond delay="0"/>
-                                  </p:stCondLst>
-                                  <p:childTnLst>
-                                    <p:set>
-                                      <p:cBhvr>
-                                        <p:cTn id="18" dur="1" fill="hold">
-                                          <p:stCondLst>
-                                            <p:cond delay="0"/>
-                                          </p:stCondLst>
-                                        </p:cTn>
-                                        <p:tgtEl>
-                                          <p:spTgt spid="3">
-                                            <p:txEl>
-                                              <p:pRg st="6" end="6"/>
-                                            </p:txEl>
-                                          </p:spTgt>
-                                        </p:tgtEl>
-                                        <p:attrNameLst>
-                                          <p:attrName>style.visibility</p:attrName>
-                                        </p:attrNameLst>
-                                      </p:cBhvr>
-                                      <p:to>
-                                        <p:strVal val="visible"/>
-                                      </p:to>
-                                    </p:set>
-                                  </p:childTnLst>
-                                </p:cTn>
-                              </p:par>
-                              <p:par>
-                                <p:cTn id="19" presetID="1" presetClass="entr" presetSubtype="0" fill="hold" grpId="0" nodeType="withEffect">
-                                  <p:stCondLst>
-                                    <p:cond delay="0"/>
-                                  </p:stCondLst>
-                                  <p:childTnLst>
-                                    <p:set>
-                                      <p:cBhvr>
-                                        <p:cTn id="20" dur="1" fill="hold">
-                                          <p:stCondLst>
-                                            <p:cond delay="0"/>
-                                          </p:stCondLst>
-                                        </p:cTn>
-                                        <p:tgtEl>
-                                          <p:spTgt spid="3">
-                                            <p:txEl>
-                                              <p:pRg st="7" end="7"/>
-                                            </p:txEl>
-                                          </p:spTgt>
-                                        </p:tgtEl>
-                                        <p:attrNameLst>
-                                          <p:attrName>style.visibility</p:attrName>
-                                        </p:attrNameLst>
-                                      </p:cBhvr>
-                                      <p:to>
-                                        <p:strVal val="visible"/>
-                                      </p:to>
-                                    </p:set>
-                                  </p:childTnLst>
-                                </p:cTn>
-                              </p:par>
                             </p:childTnLst>
                           </p:cTn>
                         </p:par>
@@ -18970,112 +20059,19 @@
                     </p:cTn>
                   </p:par>
                   <p:par>
-                    <p:cTn id="21" fill="hold">
+                    <p:cTn id="27" fill="hold">
                       <p:stCondLst>
                         <p:cond delay="indefinite"/>
                       </p:stCondLst>
                       <p:childTnLst>
                         <p:par>
-                          <p:cTn id="22" fill="hold">
+                          <p:cTn id="28" fill="hold">
                             <p:stCondLst>
                               <p:cond delay="0"/>
                             </p:stCondLst>
                             <p:childTnLst>
                               <p:par>
-                                <p:cTn id="23" presetID="1" presetClass="entr" presetSubtype="0" fill="hold" grpId="0" nodeType="clickEffect">
-                                  <p:stCondLst>
-                                    <p:cond delay="0"/>
-                                  </p:stCondLst>
-                                  <p:childTnLst>
-                                    <p:set>
-                                      <p:cBhvr>
-                                        <p:cTn id="24" dur="1" fill="hold">
-                                          <p:stCondLst>
-                                            <p:cond delay="0"/>
-                                          </p:stCondLst>
-                                        </p:cTn>
-                                        <p:tgtEl>
-                                          <p:spTgt spid="5">
-                                            <p:txEl>
-                                              <p:pRg st="0" end="0"/>
-                                            </p:txEl>
-                                          </p:spTgt>
-                                        </p:tgtEl>
-                                        <p:attrNameLst>
-                                          <p:attrName>style.visibility</p:attrName>
-                                        </p:attrNameLst>
-                                      </p:cBhvr>
-                                      <p:to>
-                                        <p:strVal val="visible"/>
-                                      </p:to>
-                                    </p:set>
-                                  </p:childTnLst>
-                                </p:cTn>
-                              </p:par>
-                              <p:par>
-                                <p:cTn id="25" presetID="1" presetClass="entr" presetSubtype="0" fill="hold" grpId="0" nodeType="withEffect">
-                                  <p:stCondLst>
-                                    <p:cond delay="0"/>
-                                  </p:stCondLst>
-                                  <p:childTnLst>
-                                    <p:set>
-                                      <p:cBhvr>
-                                        <p:cTn id="26" dur="1" fill="hold">
-                                          <p:stCondLst>
-                                            <p:cond delay="0"/>
-                                          </p:stCondLst>
-                                        </p:cTn>
-                                        <p:tgtEl>
-                                          <p:spTgt spid="5">
-                                            <p:txEl>
-                                              <p:pRg st="1" end="1"/>
-                                            </p:txEl>
-                                          </p:spTgt>
-                                        </p:tgtEl>
-                                        <p:attrNameLst>
-                                          <p:attrName>style.visibility</p:attrName>
-                                        </p:attrNameLst>
-                                      </p:cBhvr>
-                                      <p:to>
-                                        <p:strVal val="visible"/>
-                                      </p:to>
-                                    </p:set>
-                                  </p:childTnLst>
-                                </p:cTn>
-                              </p:par>
-                              <p:par>
-                                <p:cTn id="27" presetID="1" presetClass="entr" presetSubtype="0" fill="hold" grpId="0" nodeType="withEffect">
-                                  <p:stCondLst>
-                                    <p:cond delay="0"/>
-                                  </p:stCondLst>
-                                  <p:childTnLst>
-                                    <p:set>
-                                      <p:cBhvr>
-                                        <p:cTn id="28" dur="1" fill="hold">
-                                          <p:stCondLst>
-                                            <p:cond delay="0"/>
-                                          </p:stCondLst>
-                                        </p:cTn>
-                                        <p:tgtEl>
-                                          <p:spTgt spid="5">
-                                            <p:txEl>
-                                              <p:pRg st="2" end="2"/>
-                                            </p:txEl>
-                                          </p:spTgt>
-                                        </p:tgtEl>
-                                        <p:attrNameLst>
-                                          <p:attrName>style.visibility</p:attrName>
-                                        </p:attrNameLst>
-                                      </p:cBhvr>
-                                      <p:to>
-                                        <p:strVal val="visible"/>
-                                      </p:to>
-                                    </p:set>
-                                  </p:childTnLst>
-                                </p:cTn>
-                              </p:par>
-                              <p:par>
-                                <p:cTn id="29" presetID="1" presetClass="entr" presetSubtype="0" fill="hold" grpId="0" nodeType="withEffect">
+                                <p:cTn id="29" presetID="1" presetClass="entr" presetSubtype="0" fill="hold" grpId="0" nodeType="clickEffect">
                                   <p:stCondLst>
                                     <p:cond delay="0"/>
                                   </p:stCondLst>
@@ -19088,9 +20084,9 @@
                                           </p:stCondLst>
                                         </p:cTn>
                                         <p:tgtEl>
-                                          <p:spTgt spid="5">
+                                          <p:spTgt spid="3">
                                             <p:txEl>
-                                              <p:pRg st="3" end="3"/>
+                                              <p:pRg st="6" end="6"/>
                                             </p:txEl>
                                           </p:spTgt>
                                         </p:tgtEl>
@@ -19137,6 +20133,197 @@
                                           </p:stCondLst>
                                         </p:cTn>
                                         <p:tgtEl>
+                                          <p:spTgt spid="3">
+                                            <p:txEl>
+                                              <p:pRg st="7" end="7"/>
+                                            </p:txEl>
+                                          </p:spTgt>
+                                        </p:tgtEl>
+                                        <p:attrNameLst>
+                                          <p:attrName>style.visibility</p:attrName>
+                                        </p:attrNameLst>
+                                      </p:cBhvr>
+                                      <p:to>
+                                        <p:strVal val="visible"/>
+                                      </p:to>
+                                    </p:set>
+                                  </p:childTnLst>
+                                </p:cTn>
+                              </p:par>
+                            </p:childTnLst>
+                          </p:cTn>
+                        </p:par>
+                      </p:childTnLst>
+                    </p:cTn>
+                  </p:par>
+                  <p:par>
+                    <p:cTn id="35" fill="hold">
+                      <p:stCondLst>
+                        <p:cond delay="indefinite"/>
+                      </p:stCondLst>
+                      <p:childTnLst>
+                        <p:par>
+                          <p:cTn id="36" fill="hold">
+                            <p:stCondLst>
+                              <p:cond delay="0"/>
+                            </p:stCondLst>
+                            <p:childTnLst>
+                              <p:par>
+                                <p:cTn id="37" presetID="1" presetClass="entr" presetSubtype="0" fill="hold" grpId="0" nodeType="clickEffect">
+                                  <p:stCondLst>
+                                    <p:cond delay="0"/>
+                                  </p:stCondLst>
+                                  <p:childTnLst>
+                                    <p:set>
+                                      <p:cBhvr>
+                                        <p:cTn id="38" dur="1" fill="hold">
+                                          <p:stCondLst>
+                                            <p:cond delay="0"/>
+                                          </p:stCondLst>
+                                        </p:cTn>
+                                        <p:tgtEl>
+                                          <p:spTgt spid="5">
+                                            <p:txEl>
+                                              <p:pRg st="0" end="0"/>
+                                            </p:txEl>
+                                          </p:spTgt>
+                                        </p:tgtEl>
+                                        <p:attrNameLst>
+                                          <p:attrName>style.visibility</p:attrName>
+                                        </p:attrNameLst>
+                                      </p:cBhvr>
+                                      <p:to>
+                                        <p:strVal val="visible"/>
+                                      </p:to>
+                                    </p:set>
+                                  </p:childTnLst>
+                                </p:cTn>
+                              </p:par>
+                              <p:par>
+                                <p:cTn id="39" presetID="1" presetClass="entr" presetSubtype="0" fill="hold" grpId="0" nodeType="withEffect">
+                                  <p:stCondLst>
+                                    <p:cond delay="0"/>
+                                  </p:stCondLst>
+                                  <p:childTnLst>
+                                    <p:set>
+                                      <p:cBhvr>
+                                        <p:cTn id="40" dur="1" fill="hold">
+                                          <p:stCondLst>
+                                            <p:cond delay="0"/>
+                                          </p:stCondLst>
+                                        </p:cTn>
+                                        <p:tgtEl>
+                                          <p:spTgt spid="5">
+                                            <p:txEl>
+                                              <p:pRg st="1" end="1"/>
+                                            </p:txEl>
+                                          </p:spTgt>
+                                        </p:tgtEl>
+                                        <p:attrNameLst>
+                                          <p:attrName>style.visibility</p:attrName>
+                                        </p:attrNameLst>
+                                      </p:cBhvr>
+                                      <p:to>
+                                        <p:strVal val="visible"/>
+                                      </p:to>
+                                    </p:set>
+                                  </p:childTnLst>
+                                </p:cTn>
+                              </p:par>
+                              <p:par>
+                                <p:cTn id="41" presetID="1" presetClass="entr" presetSubtype="0" fill="hold" grpId="0" nodeType="withEffect">
+                                  <p:stCondLst>
+                                    <p:cond delay="0"/>
+                                  </p:stCondLst>
+                                  <p:childTnLst>
+                                    <p:set>
+                                      <p:cBhvr>
+                                        <p:cTn id="42" dur="1" fill="hold">
+                                          <p:stCondLst>
+                                            <p:cond delay="0"/>
+                                          </p:stCondLst>
+                                        </p:cTn>
+                                        <p:tgtEl>
+                                          <p:spTgt spid="5">
+                                            <p:txEl>
+                                              <p:pRg st="2" end="2"/>
+                                            </p:txEl>
+                                          </p:spTgt>
+                                        </p:tgtEl>
+                                        <p:attrNameLst>
+                                          <p:attrName>style.visibility</p:attrName>
+                                        </p:attrNameLst>
+                                      </p:cBhvr>
+                                      <p:to>
+                                        <p:strVal val="visible"/>
+                                      </p:to>
+                                    </p:set>
+                                  </p:childTnLst>
+                                </p:cTn>
+                              </p:par>
+                              <p:par>
+                                <p:cTn id="43" presetID="1" presetClass="entr" presetSubtype="0" fill="hold" grpId="0" nodeType="withEffect">
+                                  <p:stCondLst>
+                                    <p:cond delay="0"/>
+                                  </p:stCondLst>
+                                  <p:childTnLst>
+                                    <p:set>
+                                      <p:cBhvr>
+                                        <p:cTn id="44" dur="1" fill="hold">
+                                          <p:stCondLst>
+                                            <p:cond delay="0"/>
+                                          </p:stCondLst>
+                                        </p:cTn>
+                                        <p:tgtEl>
+                                          <p:spTgt spid="5">
+                                            <p:txEl>
+                                              <p:pRg st="3" end="3"/>
+                                            </p:txEl>
+                                          </p:spTgt>
+                                        </p:tgtEl>
+                                        <p:attrNameLst>
+                                          <p:attrName>style.visibility</p:attrName>
+                                        </p:attrNameLst>
+                                      </p:cBhvr>
+                                      <p:to>
+                                        <p:strVal val="visible"/>
+                                      </p:to>
+                                    </p:set>
+                                  </p:childTnLst>
+                                </p:cTn>
+                              </p:par>
+                            </p:childTnLst>
+                          </p:cTn>
+                        </p:par>
+                      </p:childTnLst>
+                    </p:cTn>
+                  </p:par>
+                  <p:par>
+                    <p:cTn id="45" fill="hold">
+                      <p:stCondLst>
+                        <p:cond delay="indefinite"/>
+                      </p:stCondLst>
+                      <p:childTnLst>
+                        <p:par>
+                          <p:cTn id="46" fill="hold">
+                            <p:stCondLst>
+                              <p:cond delay="0"/>
+                            </p:stCondLst>
+                            <p:childTnLst>
+                              <p:par>
+                                <p:cTn id="47" presetID="1" presetClass="entr" presetSubtype="0" fill="hold" grpId="0" nodeType="clickEffect">
+                                  <p:stCondLst>
+                                    <p:cond delay="0"/>
+                                  </p:stCondLst>
+                                  <p:childTnLst>
+                                    <p:set>
+                                      <p:cBhvr>
+                                        <p:cTn id="48" dur="1" fill="hold">
+                                          <p:stCondLst>
+                                            <p:cond delay="0"/>
+                                          </p:stCondLst>
+                                        </p:cTn>
+                                        <p:tgtEl>
                                           <p:spTgt spid="5">
                                             <p:txEl>
                                               <p:pRg st="4" end="4"/>
@@ -19155,14 +20342,14 @@
                                 </p:cTn>
                               </p:par>
                               <p:par>
-                                <p:cTn id="35" presetID="1" presetClass="entr" presetSubtype="0" fill="hold" grpId="0" nodeType="withEffect">
+                                <p:cTn id="49" presetID="1" presetClass="entr" presetSubtype="0" fill="hold" grpId="0" nodeType="withEffect">
                                   <p:stCondLst>
                                     <p:cond delay="0"/>
                                   </p:stCondLst>
                                   <p:childTnLst>
                                     <p:set>
                                       <p:cBhvr>
-                                        <p:cTn id="36" dur="1" fill="hold">
+                                        <p:cTn id="50" dur="1" fill="hold">
                                           <p:stCondLst>
                                             <p:cond delay="0"/>
                                           </p:stCondLst>
@@ -19213,7 +20400,7 @@
       </p:par>
     </p:tnLst>
     <p:bldLst>
-      <p:bldP spid="3" grpId="0" build="p"/>
+      <p:bldP spid="3" grpId="0" uiExpand="1" build="p" bldLvl="2"/>
       <p:bldP spid="5" grpId="0" uiExpand="1" build="p"/>
     </p:bldLst>
   </p:timing>

</xml_diff>